<commit_message>
Upload for Ferdinands Talk
Upload ferdinands talk and post as well an update front matter for Ying Zou's talk.
</commit_message>
<xml_diff>
--- a/MSOSS_title.pptx
+++ b/MSOSS_title.pptx
@@ -298,7 +298,7 @@
           <a:p>
             <a:fld id="{9FE723E2-BC0F-4A2F-84D1-E095482B85E6}" type="datetimeFigureOut">
               <a:rPr lang="en-CA" smtClean="0"/>
-              <a:t>2020-05-11</a:t>
+              <a:t>2020-05-18</a:t>
             </a:fld>
             <a:endParaRPr lang="en-CA"/>
           </a:p>
@@ -573,7 +573,7 @@
           <a:p>
             <a:fld id="{9FE723E2-BC0F-4A2F-84D1-E095482B85E6}" type="datetimeFigureOut">
               <a:rPr lang="en-CA" smtClean="0"/>
-              <a:t>2020-05-11</a:t>
+              <a:t>2020-05-18</a:t>
             </a:fld>
             <a:endParaRPr lang="en-CA"/>
           </a:p>
@@ -767,7 +767,7 @@
           <a:p>
             <a:fld id="{9FE723E2-BC0F-4A2F-84D1-E095482B85E6}" type="datetimeFigureOut">
               <a:rPr lang="en-CA" smtClean="0"/>
-              <a:t>2020-05-11</a:t>
+              <a:t>2020-05-18</a:t>
             </a:fld>
             <a:endParaRPr lang="en-CA"/>
           </a:p>
@@ -1040,7 +1040,7 @@
           <a:p>
             <a:fld id="{9FE723E2-BC0F-4A2F-84D1-E095482B85E6}" type="datetimeFigureOut">
               <a:rPr lang="en-CA" smtClean="0"/>
-              <a:t>2020-05-11</a:t>
+              <a:t>2020-05-18</a:t>
             </a:fld>
             <a:endParaRPr lang="en-CA"/>
           </a:p>
@@ -1381,7 +1381,7 @@
           <a:p>
             <a:fld id="{9FE723E2-BC0F-4A2F-84D1-E095482B85E6}" type="datetimeFigureOut">
               <a:rPr lang="en-CA" smtClean="0"/>
-              <a:t>2020-05-11</a:t>
+              <a:t>2020-05-18</a:t>
             </a:fld>
             <a:endParaRPr lang="en-CA"/>
           </a:p>
@@ -2004,7 +2004,7 @@
           <a:p>
             <a:fld id="{9FE723E2-BC0F-4A2F-84D1-E095482B85E6}" type="datetimeFigureOut">
               <a:rPr lang="en-CA" smtClean="0"/>
-              <a:t>2020-05-11</a:t>
+              <a:t>2020-05-18</a:t>
             </a:fld>
             <a:endParaRPr lang="en-CA"/>
           </a:p>
@@ -2864,7 +2864,7 @@
           <a:p>
             <a:fld id="{9FE723E2-BC0F-4A2F-84D1-E095482B85E6}" type="datetimeFigureOut">
               <a:rPr lang="en-CA" smtClean="0"/>
-              <a:t>2020-05-11</a:t>
+              <a:t>2020-05-18</a:t>
             </a:fld>
             <a:endParaRPr lang="en-CA"/>
           </a:p>
@@ -3034,7 +3034,7 @@
           <a:p>
             <a:fld id="{9FE723E2-BC0F-4A2F-84D1-E095482B85E6}" type="datetimeFigureOut">
               <a:rPr lang="en-CA" smtClean="0"/>
-              <a:t>2020-05-11</a:t>
+              <a:t>2020-05-18</a:t>
             </a:fld>
             <a:endParaRPr lang="en-CA"/>
           </a:p>
@@ -3214,7 +3214,7 @@
           <a:p>
             <a:fld id="{9FE723E2-BC0F-4A2F-84D1-E095482B85E6}" type="datetimeFigureOut">
               <a:rPr lang="en-CA" smtClean="0"/>
-              <a:t>2020-05-11</a:t>
+              <a:t>2020-05-18</a:t>
             </a:fld>
             <a:endParaRPr lang="en-CA"/>
           </a:p>
@@ -3384,7 +3384,7 @@
           <a:p>
             <a:fld id="{9FE723E2-BC0F-4A2F-84D1-E095482B85E6}" type="datetimeFigureOut">
               <a:rPr lang="en-CA" smtClean="0"/>
-              <a:t>2020-05-11</a:t>
+              <a:t>2020-05-18</a:t>
             </a:fld>
             <a:endParaRPr lang="en-CA"/>
           </a:p>
@@ -3631,7 +3631,7 @@
           <a:p>
             <a:fld id="{9FE723E2-BC0F-4A2F-84D1-E095482B85E6}" type="datetimeFigureOut">
               <a:rPr lang="en-CA" smtClean="0"/>
-              <a:t>2020-05-11</a:t>
+              <a:t>2020-05-18</a:t>
             </a:fld>
             <a:endParaRPr lang="en-CA"/>
           </a:p>
@@ -3923,7 +3923,7 @@
           <a:p>
             <a:fld id="{9FE723E2-BC0F-4A2F-84D1-E095482B85E6}" type="datetimeFigureOut">
               <a:rPr lang="en-CA" smtClean="0"/>
-              <a:t>2020-05-11</a:t>
+              <a:t>2020-05-18</a:t>
             </a:fld>
             <a:endParaRPr lang="en-CA"/>
           </a:p>
@@ -4367,7 +4367,7 @@
           <a:p>
             <a:fld id="{9FE723E2-BC0F-4A2F-84D1-E095482B85E6}" type="datetimeFigureOut">
               <a:rPr lang="en-CA" smtClean="0"/>
-              <a:t>2020-05-11</a:t>
+              <a:t>2020-05-18</a:t>
             </a:fld>
             <a:endParaRPr lang="en-CA"/>
           </a:p>
@@ -4485,7 +4485,7 @@
           <a:p>
             <a:fld id="{9FE723E2-BC0F-4A2F-84D1-E095482B85E6}" type="datetimeFigureOut">
               <a:rPr lang="en-CA" smtClean="0"/>
-              <a:t>2020-05-11</a:t>
+              <a:t>2020-05-18</a:t>
             </a:fld>
             <a:endParaRPr lang="en-CA"/>
           </a:p>
@@ -4580,7 +4580,7 @@
           <a:p>
             <a:fld id="{9FE723E2-BC0F-4A2F-84D1-E095482B85E6}" type="datetimeFigureOut">
               <a:rPr lang="en-CA" smtClean="0"/>
-              <a:t>2020-05-11</a:t>
+              <a:t>2020-05-18</a:t>
             </a:fld>
             <a:endParaRPr lang="en-CA"/>
           </a:p>
@@ -4859,7 +4859,7 @@
           <a:p>
             <a:fld id="{9FE723E2-BC0F-4A2F-84D1-E095482B85E6}" type="datetimeFigureOut">
               <a:rPr lang="en-CA" smtClean="0"/>
-              <a:t>2020-05-11</a:t>
+              <a:t>2020-05-18</a:t>
             </a:fld>
             <a:endParaRPr lang="en-CA"/>
           </a:p>
@@ -5134,7 +5134,7 @@
           <a:p>
             <a:fld id="{9FE723E2-BC0F-4A2F-84D1-E095482B85E6}" type="datetimeFigureOut">
               <a:rPr lang="en-CA" smtClean="0"/>
-              <a:t>2020-05-11</a:t>
+              <a:t>2020-05-18</a:t>
             </a:fld>
             <a:endParaRPr lang="en-CA"/>
           </a:p>
@@ -5563,7 +5563,7 @@
           <a:p>
             <a:fld id="{9FE723E2-BC0F-4A2F-84D1-E095482B85E6}" type="datetimeFigureOut">
               <a:rPr lang="en-CA" smtClean="0"/>
-              <a:t>2020-05-11</a:t>
+              <a:t>2020-05-18</a:t>
             </a:fld>
             <a:endParaRPr lang="en-CA"/>
           </a:p>
@@ -6247,7 +6247,7 @@
                   <a:srgbClr val="FF0000"/>
                 </a:solidFill>
               </a:rPr>
-              <a:t>Marcos</a:t>
+              <a:t>Kyle</a:t>
             </a:r>
             <a:r>
               <a:rPr lang="en-CA" sz="3200" b="1" dirty="0">
@@ -6263,7 +6263,7 @@
                   <a:srgbClr val="FF0000"/>
                 </a:solidFill>
               </a:rPr>
-              <a:t>Use the chat button at the bottom of your screen</a:t>
+              <a:t>Use the chat button at the bottom of your screen (try and keep questions concise)</a:t>
             </a:r>
             <a:r>
               <a:rPr lang="en-CA" sz="3200" b="1" dirty="0">
@@ -6271,7 +6271,7 @@
                   <a:prstClr val="white"/>
                 </a:solidFill>
               </a:rPr>
-              <a:t>. She will do her best to get to your question at the end of the seminar.</a:t>
+              <a:t>. He will do his best to get to your question at the end of the seminar.</a:t>
             </a:r>
           </a:p>
           <a:p>

</xml_diff>

<commit_message>
Change for next weeks seminar
</commit_message>
<xml_diff>
--- a/MSOSS_title.pptx
+++ b/MSOSS_title.pptx
@@ -298,7 +298,7 @@
           <a:p>
             <a:fld id="{9FE723E2-BC0F-4A2F-84D1-E095482B85E6}" type="datetimeFigureOut">
               <a:rPr lang="en-CA" smtClean="0"/>
-              <a:t>2020-06-01</a:t>
+              <a:t>2020-06-08</a:t>
             </a:fld>
             <a:endParaRPr lang="en-CA"/>
           </a:p>
@@ -573,7 +573,7 @@
           <a:p>
             <a:fld id="{9FE723E2-BC0F-4A2F-84D1-E095482B85E6}" type="datetimeFigureOut">
               <a:rPr lang="en-CA" smtClean="0"/>
-              <a:t>2020-06-01</a:t>
+              <a:t>2020-06-08</a:t>
             </a:fld>
             <a:endParaRPr lang="en-CA"/>
           </a:p>
@@ -767,7 +767,7 @@
           <a:p>
             <a:fld id="{9FE723E2-BC0F-4A2F-84D1-E095482B85E6}" type="datetimeFigureOut">
               <a:rPr lang="en-CA" smtClean="0"/>
-              <a:t>2020-06-01</a:t>
+              <a:t>2020-06-08</a:t>
             </a:fld>
             <a:endParaRPr lang="en-CA"/>
           </a:p>
@@ -1040,7 +1040,7 @@
           <a:p>
             <a:fld id="{9FE723E2-BC0F-4A2F-84D1-E095482B85E6}" type="datetimeFigureOut">
               <a:rPr lang="en-CA" smtClean="0"/>
-              <a:t>2020-06-01</a:t>
+              <a:t>2020-06-08</a:t>
             </a:fld>
             <a:endParaRPr lang="en-CA"/>
           </a:p>
@@ -1381,7 +1381,7 @@
           <a:p>
             <a:fld id="{9FE723E2-BC0F-4A2F-84D1-E095482B85E6}" type="datetimeFigureOut">
               <a:rPr lang="en-CA" smtClean="0"/>
-              <a:t>2020-06-01</a:t>
+              <a:t>2020-06-08</a:t>
             </a:fld>
             <a:endParaRPr lang="en-CA"/>
           </a:p>
@@ -2004,7 +2004,7 @@
           <a:p>
             <a:fld id="{9FE723E2-BC0F-4A2F-84D1-E095482B85E6}" type="datetimeFigureOut">
               <a:rPr lang="en-CA" smtClean="0"/>
-              <a:t>2020-06-01</a:t>
+              <a:t>2020-06-08</a:t>
             </a:fld>
             <a:endParaRPr lang="en-CA"/>
           </a:p>
@@ -2864,7 +2864,7 @@
           <a:p>
             <a:fld id="{9FE723E2-BC0F-4A2F-84D1-E095482B85E6}" type="datetimeFigureOut">
               <a:rPr lang="en-CA" smtClean="0"/>
-              <a:t>2020-06-01</a:t>
+              <a:t>2020-06-08</a:t>
             </a:fld>
             <a:endParaRPr lang="en-CA"/>
           </a:p>
@@ -3034,7 +3034,7 @@
           <a:p>
             <a:fld id="{9FE723E2-BC0F-4A2F-84D1-E095482B85E6}" type="datetimeFigureOut">
               <a:rPr lang="en-CA" smtClean="0"/>
-              <a:t>2020-06-01</a:t>
+              <a:t>2020-06-08</a:t>
             </a:fld>
             <a:endParaRPr lang="en-CA"/>
           </a:p>
@@ -3214,7 +3214,7 @@
           <a:p>
             <a:fld id="{9FE723E2-BC0F-4A2F-84D1-E095482B85E6}" type="datetimeFigureOut">
               <a:rPr lang="en-CA" smtClean="0"/>
-              <a:t>2020-06-01</a:t>
+              <a:t>2020-06-08</a:t>
             </a:fld>
             <a:endParaRPr lang="en-CA"/>
           </a:p>
@@ -3384,7 +3384,7 @@
           <a:p>
             <a:fld id="{9FE723E2-BC0F-4A2F-84D1-E095482B85E6}" type="datetimeFigureOut">
               <a:rPr lang="en-CA" smtClean="0"/>
-              <a:t>2020-06-01</a:t>
+              <a:t>2020-06-08</a:t>
             </a:fld>
             <a:endParaRPr lang="en-CA"/>
           </a:p>
@@ -3631,7 +3631,7 @@
           <a:p>
             <a:fld id="{9FE723E2-BC0F-4A2F-84D1-E095482B85E6}" type="datetimeFigureOut">
               <a:rPr lang="en-CA" smtClean="0"/>
-              <a:t>2020-06-01</a:t>
+              <a:t>2020-06-08</a:t>
             </a:fld>
             <a:endParaRPr lang="en-CA"/>
           </a:p>
@@ -3923,7 +3923,7 @@
           <a:p>
             <a:fld id="{9FE723E2-BC0F-4A2F-84D1-E095482B85E6}" type="datetimeFigureOut">
               <a:rPr lang="en-CA" smtClean="0"/>
-              <a:t>2020-06-01</a:t>
+              <a:t>2020-06-08</a:t>
             </a:fld>
             <a:endParaRPr lang="en-CA"/>
           </a:p>
@@ -4367,7 +4367,7 @@
           <a:p>
             <a:fld id="{9FE723E2-BC0F-4A2F-84D1-E095482B85E6}" type="datetimeFigureOut">
               <a:rPr lang="en-CA" smtClean="0"/>
-              <a:t>2020-06-01</a:t>
+              <a:t>2020-06-08</a:t>
             </a:fld>
             <a:endParaRPr lang="en-CA"/>
           </a:p>
@@ -4485,7 +4485,7 @@
           <a:p>
             <a:fld id="{9FE723E2-BC0F-4A2F-84D1-E095482B85E6}" type="datetimeFigureOut">
               <a:rPr lang="en-CA" smtClean="0"/>
-              <a:t>2020-06-01</a:t>
+              <a:t>2020-06-08</a:t>
             </a:fld>
             <a:endParaRPr lang="en-CA"/>
           </a:p>
@@ -4580,7 +4580,7 @@
           <a:p>
             <a:fld id="{9FE723E2-BC0F-4A2F-84D1-E095482B85E6}" type="datetimeFigureOut">
               <a:rPr lang="en-CA" smtClean="0"/>
-              <a:t>2020-06-01</a:t>
+              <a:t>2020-06-08</a:t>
             </a:fld>
             <a:endParaRPr lang="en-CA"/>
           </a:p>
@@ -4859,7 +4859,7 @@
           <a:p>
             <a:fld id="{9FE723E2-BC0F-4A2F-84D1-E095482B85E6}" type="datetimeFigureOut">
               <a:rPr lang="en-CA" smtClean="0"/>
-              <a:t>2020-06-01</a:t>
+              <a:t>2020-06-08</a:t>
             </a:fld>
             <a:endParaRPr lang="en-CA"/>
           </a:p>
@@ -5134,7 +5134,7 @@
           <a:p>
             <a:fld id="{9FE723E2-BC0F-4A2F-84D1-E095482B85E6}" type="datetimeFigureOut">
               <a:rPr lang="en-CA" smtClean="0"/>
-              <a:t>2020-06-01</a:t>
+              <a:t>2020-06-08</a:t>
             </a:fld>
             <a:endParaRPr lang="en-CA"/>
           </a:p>
@@ -5563,7 +5563,7 @@
           <a:p>
             <a:fld id="{9FE723E2-BC0F-4A2F-84D1-E095482B85E6}" type="datetimeFigureOut">
               <a:rPr lang="en-CA" smtClean="0"/>
-              <a:t>2020-06-01</a:t>
+              <a:t>2020-06-08</a:t>
             </a:fld>
             <a:endParaRPr lang="en-CA"/>
           </a:p>
@@ -6242,12 +6242,12 @@
               <a:t>Questions should be asked to </a:t>
             </a:r>
             <a:r>
-              <a:rPr lang="en-CA" sz="3200" b="1" dirty="0" err="1">
+              <a:rPr lang="en-CA" sz="3200" b="1" dirty="0">
                 <a:solidFill>
                   <a:srgbClr val="FF0000"/>
                 </a:solidFill>
               </a:rPr>
-              <a:t>Nithin</a:t>
+              <a:t>Homayon</a:t>
             </a:r>
             <a:r>
               <a:rPr lang="en-CA" sz="3200" b="1" dirty="0">

</xml_diff>

<commit_message>
Updates for new seminar
New blog post and links.
</commit_message>
<xml_diff>
--- a/MSOSS_title.pptx
+++ b/MSOSS_title.pptx
@@ -298,7 +298,7 @@
           <a:p>
             <a:fld id="{9FE723E2-BC0F-4A2F-84D1-E095482B85E6}" type="datetimeFigureOut">
               <a:rPr lang="en-CA" smtClean="0"/>
-              <a:t>2020-08-31</a:t>
+              <a:t>2020-09-21</a:t>
             </a:fld>
             <a:endParaRPr lang="en-CA"/>
           </a:p>
@@ -573,7 +573,7 @@
           <a:p>
             <a:fld id="{9FE723E2-BC0F-4A2F-84D1-E095482B85E6}" type="datetimeFigureOut">
               <a:rPr lang="en-CA" smtClean="0"/>
-              <a:t>2020-08-31</a:t>
+              <a:t>2020-09-21</a:t>
             </a:fld>
             <a:endParaRPr lang="en-CA"/>
           </a:p>
@@ -767,7 +767,7 @@
           <a:p>
             <a:fld id="{9FE723E2-BC0F-4A2F-84D1-E095482B85E6}" type="datetimeFigureOut">
               <a:rPr lang="en-CA" smtClean="0"/>
-              <a:t>2020-08-31</a:t>
+              <a:t>2020-09-21</a:t>
             </a:fld>
             <a:endParaRPr lang="en-CA"/>
           </a:p>
@@ -1040,7 +1040,7 @@
           <a:p>
             <a:fld id="{9FE723E2-BC0F-4A2F-84D1-E095482B85E6}" type="datetimeFigureOut">
               <a:rPr lang="en-CA" smtClean="0"/>
-              <a:t>2020-08-31</a:t>
+              <a:t>2020-09-21</a:t>
             </a:fld>
             <a:endParaRPr lang="en-CA"/>
           </a:p>
@@ -1381,7 +1381,7 @@
           <a:p>
             <a:fld id="{9FE723E2-BC0F-4A2F-84D1-E095482B85E6}" type="datetimeFigureOut">
               <a:rPr lang="en-CA" smtClean="0"/>
-              <a:t>2020-08-31</a:t>
+              <a:t>2020-09-21</a:t>
             </a:fld>
             <a:endParaRPr lang="en-CA"/>
           </a:p>
@@ -2004,7 +2004,7 @@
           <a:p>
             <a:fld id="{9FE723E2-BC0F-4A2F-84D1-E095482B85E6}" type="datetimeFigureOut">
               <a:rPr lang="en-CA" smtClean="0"/>
-              <a:t>2020-08-31</a:t>
+              <a:t>2020-09-21</a:t>
             </a:fld>
             <a:endParaRPr lang="en-CA"/>
           </a:p>
@@ -2864,7 +2864,7 @@
           <a:p>
             <a:fld id="{9FE723E2-BC0F-4A2F-84D1-E095482B85E6}" type="datetimeFigureOut">
               <a:rPr lang="en-CA" smtClean="0"/>
-              <a:t>2020-08-31</a:t>
+              <a:t>2020-09-21</a:t>
             </a:fld>
             <a:endParaRPr lang="en-CA"/>
           </a:p>
@@ -3034,7 +3034,7 @@
           <a:p>
             <a:fld id="{9FE723E2-BC0F-4A2F-84D1-E095482B85E6}" type="datetimeFigureOut">
               <a:rPr lang="en-CA" smtClean="0"/>
-              <a:t>2020-08-31</a:t>
+              <a:t>2020-09-21</a:t>
             </a:fld>
             <a:endParaRPr lang="en-CA"/>
           </a:p>
@@ -3214,7 +3214,7 @@
           <a:p>
             <a:fld id="{9FE723E2-BC0F-4A2F-84D1-E095482B85E6}" type="datetimeFigureOut">
               <a:rPr lang="en-CA" smtClean="0"/>
-              <a:t>2020-08-31</a:t>
+              <a:t>2020-09-21</a:t>
             </a:fld>
             <a:endParaRPr lang="en-CA"/>
           </a:p>
@@ -3384,7 +3384,7 @@
           <a:p>
             <a:fld id="{9FE723E2-BC0F-4A2F-84D1-E095482B85E6}" type="datetimeFigureOut">
               <a:rPr lang="en-CA" smtClean="0"/>
-              <a:t>2020-08-31</a:t>
+              <a:t>2020-09-21</a:t>
             </a:fld>
             <a:endParaRPr lang="en-CA"/>
           </a:p>
@@ -3631,7 +3631,7 @@
           <a:p>
             <a:fld id="{9FE723E2-BC0F-4A2F-84D1-E095482B85E6}" type="datetimeFigureOut">
               <a:rPr lang="en-CA" smtClean="0"/>
-              <a:t>2020-08-31</a:t>
+              <a:t>2020-09-21</a:t>
             </a:fld>
             <a:endParaRPr lang="en-CA"/>
           </a:p>
@@ -3923,7 +3923,7 @@
           <a:p>
             <a:fld id="{9FE723E2-BC0F-4A2F-84D1-E095482B85E6}" type="datetimeFigureOut">
               <a:rPr lang="en-CA" smtClean="0"/>
-              <a:t>2020-08-31</a:t>
+              <a:t>2020-09-21</a:t>
             </a:fld>
             <a:endParaRPr lang="en-CA"/>
           </a:p>
@@ -4367,7 +4367,7 @@
           <a:p>
             <a:fld id="{9FE723E2-BC0F-4A2F-84D1-E095482B85E6}" type="datetimeFigureOut">
               <a:rPr lang="en-CA" smtClean="0"/>
-              <a:t>2020-08-31</a:t>
+              <a:t>2020-09-21</a:t>
             </a:fld>
             <a:endParaRPr lang="en-CA"/>
           </a:p>
@@ -4485,7 +4485,7 @@
           <a:p>
             <a:fld id="{9FE723E2-BC0F-4A2F-84D1-E095482B85E6}" type="datetimeFigureOut">
               <a:rPr lang="en-CA" smtClean="0"/>
-              <a:t>2020-08-31</a:t>
+              <a:t>2020-09-21</a:t>
             </a:fld>
             <a:endParaRPr lang="en-CA"/>
           </a:p>
@@ -4580,7 +4580,7 @@
           <a:p>
             <a:fld id="{9FE723E2-BC0F-4A2F-84D1-E095482B85E6}" type="datetimeFigureOut">
               <a:rPr lang="en-CA" smtClean="0"/>
-              <a:t>2020-08-31</a:t>
+              <a:t>2020-09-21</a:t>
             </a:fld>
             <a:endParaRPr lang="en-CA"/>
           </a:p>
@@ -4859,7 +4859,7 @@
           <a:p>
             <a:fld id="{9FE723E2-BC0F-4A2F-84D1-E095482B85E6}" type="datetimeFigureOut">
               <a:rPr lang="en-CA" smtClean="0"/>
-              <a:t>2020-08-31</a:t>
+              <a:t>2020-09-21</a:t>
             </a:fld>
             <a:endParaRPr lang="en-CA"/>
           </a:p>
@@ -5134,7 +5134,7 @@
           <a:p>
             <a:fld id="{9FE723E2-BC0F-4A2F-84D1-E095482B85E6}" type="datetimeFigureOut">
               <a:rPr lang="en-CA" smtClean="0"/>
-              <a:t>2020-08-31</a:t>
+              <a:t>2020-09-21</a:t>
             </a:fld>
             <a:endParaRPr lang="en-CA"/>
           </a:p>
@@ -5563,7 +5563,7 @@
           <a:p>
             <a:fld id="{9FE723E2-BC0F-4A2F-84D1-E095482B85E6}" type="datetimeFigureOut">
               <a:rPr lang="en-CA" smtClean="0"/>
-              <a:t>2020-08-31</a:t>
+              <a:t>2020-09-21</a:t>
             </a:fld>
             <a:endParaRPr lang="en-CA"/>
           </a:p>
@@ -6239,18 +6239,26 @@
                   <a:prstClr val="white"/>
                 </a:solidFill>
               </a:rPr>
-              <a:t>Questions should be asked to </a:t>
-            </a:r>
-            <a:r>
-              <a:rPr lang="en-CA" sz="3200" b="1" dirty="0">
+              <a:t>Questions should be asked </a:t>
+            </a:r>
+            <a:r>
+              <a:rPr lang="en-CA" sz="3200" b="1">
+                <a:solidFill>
+                  <a:prstClr val="white"/>
+                </a:solidFill>
+              </a:rPr>
+              <a:t>to </a:t>
+            </a:r>
+            <a:r>
+              <a:rPr lang="en-CA" sz="3200" b="1">
                 <a:solidFill>
                   <a:srgbClr val="FF0000"/>
                 </a:solidFill>
               </a:rPr>
-              <a:t>David</a:t>
-            </a:r>
-            <a:r>
-              <a:rPr lang="en-CA" sz="3200" b="1" dirty="0">
+              <a:t>Remya</a:t>
+            </a:r>
+            <a:r>
+              <a:rPr lang="en-CA" sz="3200" b="1">
                 <a:solidFill>
                   <a:prstClr val="white"/>
                 </a:solidFill>

</xml_diff>

<commit_message>
Setup for next talk
Finished Jerry's post and changed site for Angelines talk
</commit_message>
<xml_diff>
--- a/MSOSS_title.pptx
+++ b/MSOSS_title.pptx
@@ -298,7 +298,7 @@
           <a:p>
             <a:fld id="{9FE723E2-BC0F-4A2F-84D1-E095482B85E6}" type="datetimeFigureOut">
               <a:rPr lang="en-CA" smtClean="0"/>
-              <a:t>2020-09-21</a:t>
+              <a:t>2020-09-28</a:t>
             </a:fld>
             <a:endParaRPr lang="en-CA"/>
           </a:p>
@@ -573,7 +573,7 @@
           <a:p>
             <a:fld id="{9FE723E2-BC0F-4A2F-84D1-E095482B85E6}" type="datetimeFigureOut">
               <a:rPr lang="en-CA" smtClean="0"/>
-              <a:t>2020-09-21</a:t>
+              <a:t>2020-09-28</a:t>
             </a:fld>
             <a:endParaRPr lang="en-CA"/>
           </a:p>
@@ -767,7 +767,7 @@
           <a:p>
             <a:fld id="{9FE723E2-BC0F-4A2F-84D1-E095482B85E6}" type="datetimeFigureOut">
               <a:rPr lang="en-CA" smtClean="0"/>
-              <a:t>2020-09-21</a:t>
+              <a:t>2020-09-28</a:t>
             </a:fld>
             <a:endParaRPr lang="en-CA"/>
           </a:p>
@@ -1040,7 +1040,7 @@
           <a:p>
             <a:fld id="{9FE723E2-BC0F-4A2F-84D1-E095482B85E6}" type="datetimeFigureOut">
               <a:rPr lang="en-CA" smtClean="0"/>
-              <a:t>2020-09-21</a:t>
+              <a:t>2020-09-28</a:t>
             </a:fld>
             <a:endParaRPr lang="en-CA"/>
           </a:p>
@@ -1381,7 +1381,7 @@
           <a:p>
             <a:fld id="{9FE723E2-BC0F-4A2F-84D1-E095482B85E6}" type="datetimeFigureOut">
               <a:rPr lang="en-CA" smtClean="0"/>
-              <a:t>2020-09-21</a:t>
+              <a:t>2020-09-28</a:t>
             </a:fld>
             <a:endParaRPr lang="en-CA"/>
           </a:p>
@@ -2004,7 +2004,7 @@
           <a:p>
             <a:fld id="{9FE723E2-BC0F-4A2F-84D1-E095482B85E6}" type="datetimeFigureOut">
               <a:rPr lang="en-CA" smtClean="0"/>
-              <a:t>2020-09-21</a:t>
+              <a:t>2020-09-28</a:t>
             </a:fld>
             <a:endParaRPr lang="en-CA"/>
           </a:p>
@@ -2864,7 +2864,7 @@
           <a:p>
             <a:fld id="{9FE723E2-BC0F-4A2F-84D1-E095482B85E6}" type="datetimeFigureOut">
               <a:rPr lang="en-CA" smtClean="0"/>
-              <a:t>2020-09-21</a:t>
+              <a:t>2020-09-28</a:t>
             </a:fld>
             <a:endParaRPr lang="en-CA"/>
           </a:p>
@@ -3034,7 +3034,7 @@
           <a:p>
             <a:fld id="{9FE723E2-BC0F-4A2F-84D1-E095482B85E6}" type="datetimeFigureOut">
               <a:rPr lang="en-CA" smtClean="0"/>
-              <a:t>2020-09-21</a:t>
+              <a:t>2020-09-28</a:t>
             </a:fld>
             <a:endParaRPr lang="en-CA"/>
           </a:p>
@@ -3214,7 +3214,7 @@
           <a:p>
             <a:fld id="{9FE723E2-BC0F-4A2F-84D1-E095482B85E6}" type="datetimeFigureOut">
               <a:rPr lang="en-CA" smtClean="0"/>
-              <a:t>2020-09-21</a:t>
+              <a:t>2020-09-28</a:t>
             </a:fld>
             <a:endParaRPr lang="en-CA"/>
           </a:p>
@@ -3384,7 +3384,7 @@
           <a:p>
             <a:fld id="{9FE723E2-BC0F-4A2F-84D1-E095482B85E6}" type="datetimeFigureOut">
               <a:rPr lang="en-CA" smtClean="0"/>
-              <a:t>2020-09-21</a:t>
+              <a:t>2020-09-28</a:t>
             </a:fld>
             <a:endParaRPr lang="en-CA"/>
           </a:p>
@@ -3631,7 +3631,7 @@
           <a:p>
             <a:fld id="{9FE723E2-BC0F-4A2F-84D1-E095482B85E6}" type="datetimeFigureOut">
               <a:rPr lang="en-CA" smtClean="0"/>
-              <a:t>2020-09-21</a:t>
+              <a:t>2020-09-28</a:t>
             </a:fld>
             <a:endParaRPr lang="en-CA"/>
           </a:p>
@@ -3923,7 +3923,7 @@
           <a:p>
             <a:fld id="{9FE723E2-BC0F-4A2F-84D1-E095482B85E6}" type="datetimeFigureOut">
               <a:rPr lang="en-CA" smtClean="0"/>
-              <a:t>2020-09-21</a:t>
+              <a:t>2020-09-28</a:t>
             </a:fld>
             <a:endParaRPr lang="en-CA"/>
           </a:p>
@@ -4367,7 +4367,7 @@
           <a:p>
             <a:fld id="{9FE723E2-BC0F-4A2F-84D1-E095482B85E6}" type="datetimeFigureOut">
               <a:rPr lang="en-CA" smtClean="0"/>
-              <a:t>2020-09-21</a:t>
+              <a:t>2020-09-28</a:t>
             </a:fld>
             <a:endParaRPr lang="en-CA"/>
           </a:p>
@@ -4485,7 +4485,7 @@
           <a:p>
             <a:fld id="{9FE723E2-BC0F-4A2F-84D1-E095482B85E6}" type="datetimeFigureOut">
               <a:rPr lang="en-CA" smtClean="0"/>
-              <a:t>2020-09-21</a:t>
+              <a:t>2020-09-28</a:t>
             </a:fld>
             <a:endParaRPr lang="en-CA"/>
           </a:p>
@@ -4580,7 +4580,7 @@
           <a:p>
             <a:fld id="{9FE723E2-BC0F-4A2F-84D1-E095482B85E6}" type="datetimeFigureOut">
               <a:rPr lang="en-CA" smtClean="0"/>
-              <a:t>2020-09-21</a:t>
+              <a:t>2020-09-28</a:t>
             </a:fld>
             <a:endParaRPr lang="en-CA"/>
           </a:p>
@@ -4859,7 +4859,7 @@
           <a:p>
             <a:fld id="{9FE723E2-BC0F-4A2F-84D1-E095482B85E6}" type="datetimeFigureOut">
               <a:rPr lang="en-CA" smtClean="0"/>
-              <a:t>2020-09-21</a:t>
+              <a:t>2020-09-28</a:t>
             </a:fld>
             <a:endParaRPr lang="en-CA"/>
           </a:p>
@@ -5134,7 +5134,7 @@
           <a:p>
             <a:fld id="{9FE723E2-BC0F-4A2F-84D1-E095482B85E6}" type="datetimeFigureOut">
               <a:rPr lang="en-CA" smtClean="0"/>
-              <a:t>2020-09-21</a:t>
+              <a:t>2020-09-28</a:t>
             </a:fld>
             <a:endParaRPr lang="en-CA"/>
           </a:p>
@@ -5563,7 +5563,7 @@
           <a:p>
             <a:fld id="{9FE723E2-BC0F-4A2F-84D1-E095482B85E6}" type="datetimeFigureOut">
               <a:rPr lang="en-CA" smtClean="0"/>
-              <a:t>2020-09-21</a:t>
+              <a:t>2020-09-28</a:t>
             </a:fld>
             <a:endParaRPr lang="en-CA"/>
           </a:p>
@@ -6239,26 +6239,18 @@
                   <a:prstClr val="white"/>
                 </a:solidFill>
               </a:rPr>
-              <a:t>Questions should be asked </a:t>
-            </a:r>
-            <a:r>
-              <a:rPr lang="en-CA" sz="3200" b="1">
-                <a:solidFill>
-                  <a:prstClr val="white"/>
-                </a:solidFill>
-              </a:rPr>
-              <a:t>to </a:t>
-            </a:r>
-            <a:r>
-              <a:rPr lang="en-CA" sz="3200" b="1">
+              <a:t>Questions should be asked to </a:t>
+            </a:r>
+            <a:r>
+              <a:rPr lang="en-CA" sz="3200" b="1" dirty="0">
                 <a:solidFill>
                   <a:srgbClr val="FF0000"/>
                 </a:solidFill>
               </a:rPr>
-              <a:t>Remya</a:t>
-            </a:r>
-            <a:r>
-              <a:rPr lang="en-CA" sz="3200" b="1">
+              <a:t>Kyle</a:t>
+            </a:r>
+            <a:r>
+              <a:rPr lang="en-CA" sz="3200" b="1" dirty="0">
                 <a:solidFill>
                   <a:prstClr val="white"/>
                 </a:solidFill>

</xml_diff>

<commit_message>
Setup posts for angelines talk
</commit_message>
<xml_diff>
--- a/MSOSS_title.pptx
+++ b/MSOSS_title.pptx
@@ -298,7 +298,7 @@
           <a:p>
             <a:fld id="{9FE723E2-BC0F-4A2F-84D1-E095482B85E6}" type="datetimeFigureOut">
               <a:rPr lang="en-CA" smtClean="0"/>
-              <a:t>2020-09-28</a:t>
+              <a:t>2020-10-05</a:t>
             </a:fld>
             <a:endParaRPr lang="en-CA"/>
           </a:p>
@@ -573,7 +573,7 @@
           <a:p>
             <a:fld id="{9FE723E2-BC0F-4A2F-84D1-E095482B85E6}" type="datetimeFigureOut">
               <a:rPr lang="en-CA" smtClean="0"/>
-              <a:t>2020-09-28</a:t>
+              <a:t>2020-10-05</a:t>
             </a:fld>
             <a:endParaRPr lang="en-CA"/>
           </a:p>
@@ -767,7 +767,7 @@
           <a:p>
             <a:fld id="{9FE723E2-BC0F-4A2F-84D1-E095482B85E6}" type="datetimeFigureOut">
               <a:rPr lang="en-CA" smtClean="0"/>
-              <a:t>2020-09-28</a:t>
+              <a:t>2020-10-05</a:t>
             </a:fld>
             <a:endParaRPr lang="en-CA"/>
           </a:p>
@@ -1040,7 +1040,7 @@
           <a:p>
             <a:fld id="{9FE723E2-BC0F-4A2F-84D1-E095482B85E6}" type="datetimeFigureOut">
               <a:rPr lang="en-CA" smtClean="0"/>
-              <a:t>2020-09-28</a:t>
+              <a:t>2020-10-05</a:t>
             </a:fld>
             <a:endParaRPr lang="en-CA"/>
           </a:p>
@@ -1381,7 +1381,7 @@
           <a:p>
             <a:fld id="{9FE723E2-BC0F-4A2F-84D1-E095482B85E6}" type="datetimeFigureOut">
               <a:rPr lang="en-CA" smtClean="0"/>
-              <a:t>2020-09-28</a:t>
+              <a:t>2020-10-05</a:t>
             </a:fld>
             <a:endParaRPr lang="en-CA"/>
           </a:p>
@@ -2004,7 +2004,7 @@
           <a:p>
             <a:fld id="{9FE723E2-BC0F-4A2F-84D1-E095482B85E6}" type="datetimeFigureOut">
               <a:rPr lang="en-CA" smtClean="0"/>
-              <a:t>2020-09-28</a:t>
+              <a:t>2020-10-05</a:t>
             </a:fld>
             <a:endParaRPr lang="en-CA"/>
           </a:p>
@@ -2864,7 +2864,7 @@
           <a:p>
             <a:fld id="{9FE723E2-BC0F-4A2F-84D1-E095482B85E6}" type="datetimeFigureOut">
               <a:rPr lang="en-CA" smtClean="0"/>
-              <a:t>2020-09-28</a:t>
+              <a:t>2020-10-05</a:t>
             </a:fld>
             <a:endParaRPr lang="en-CA"/>
           </a:p>
@@ -3034,7 +3034,7 @@
           <a:p>
             <a:fld id="{9FE723E2-BC0F-4A2F-84D1-E095482B85E6}" type="datetimeFigureOut">
               <a:rPr lang="en-CA" smtClean="0"/>
-              <a:t>2020-09-28</a:t>
+              <a:t>2020-10-05</a:t>
             </a:fld>
             <a:endParaRPr lang="en-CA"/>
           </a:p>
@@ -3214,7 +3214,7 @@
           <a:p>
             <a:fld id="{9FE723E2-BC0F-4A2F-84D1-E095482B85E6}" type="datetimeFigureOut">
               <a:rPr lang="en-CA" smtClean="0"/>
-              <a:t>2020-09-28</a:t>
+              <a:t>2020-10-05</a:t>
             </a:fld>
             <a:endParaRPr lang="en-CA"/>
           </a:p>
@@ -3384,7 +3384,7 @@
           <a:p>
             <a:fld id="{9FE723E2-BC0F-4A2F-84D1-E095482B85E6}" type="datetimeFigureOut">
               <a:rPr lang="en-CA" smtClean="0"/>
-              <a:t>2020-09-28</a:t>
+              <a:t>2020-10-05</a:t>
             </a:fld>
             <a:endParaRPr lang="en-CA"/>
           </a:p>
@@ -3631,7 +3631,7 @@
           <a:p>
             <a:fld id="{9FE723E2-BC0F-4A2F-84D1-E095482B85E6}" type="datetimeFigureOut">
               <a:rPr lang="en-CA" smtClean="0"/>
-              <a:t>2020-09-28</a:t>
+              <a:t>2020-10-05</a:t>
             </a:fld>
             <a:endParaRPr lang="en-CA"/>
           </a:p>
@@ -3923,7 +3923,7 @@
           <a:p>
             <a:fld id="{9FE723E2-BC0F-4A2F-84D1-E095482B85E6}" type="datetimeFigureOut">
               <a:rPr lang="en-CA" smtClean="0"/>
-              <a:t>2020-09-28</a:t>
+              <a:t>2020-10-05</a:t>
             </a:fld>
             <a:endParaRPr lang="en-CA"/>
           </a:p>
@@ -4367,7 +4367,7 @@
           <a:p>
             <a:fld id="{9FE723E2-BC0F-4A2F-84D1-E095482B85E6}" type="datetimeFigureOut">
               <a:rPr lang="en-CA" smtClean="0"/>
-              <a:t>2020-09-28</a:t>
+              <a:t>2020-10-05</a:t>
             </a:fld>
             <a:endParaRPr lang="en-CA"/>
           </a:p>
@@ -4485,7 +4485,7 @@
           <a:p>
             <a:fld id="{9FE723E2-BC0F-4A2F-84D1-E095482B85E6}" type="datetimeFigureOut">
               <a:rPr lang="en-CA" smtClean="0"/>
-              <a:t>2020-09-28</a:t>
+              <a:t>2020-10-05</a:t>
             </a:fld>
             <a:endParaRPr lang="en-CA"/>
           </a:p>
@@ -4580,7 +4580,7 @@
           <a:p>
             <a:fld id="{9FE723E2-BC0F-4A2F-84D1-E095482B85E6}" type="datetimeFigureOut">
               <a:rPr lang="en-CA" smtClean="0"/>
-              <a:t>2020-09-28</a:t>
+              <a:t>2020-10-05</a:t>
             </a:fld>
             <a:endParaRPr lang="en-CA"/>
           </a:p>
@@ -4859,7 +4859,7 @@
           <a:p>
             <a:fld id="{9FE723E2-BC0F-4A2F-84D1-E095482B85E6}" type="datetimeFigureOut">
               <a:rPr lang="en-CA" smtClean="0"/>
-              <a:t>2020-09-28</a:t>
+              <a:t>2020-10-05</a:t>
             </a:fld>
             <a:endParaRPr lang="en-CA"/>
           </a:p>
@@ -5134,7 +5134,7 @@
           <a:p>
             <a:fld id="{9FE723E2-BC0F-4A2F-84D1-E095482B85E6}" type="datetimeFigureOut">
               <a:rPr lang="en-CA" smtClean="0"/>
-              <a:t>2020-09-28</a:t>
+              <a:t>2020-10-05</a:t>
             </a:fld>
             <a:endParaRPr lang="en-CA"/>
           </a:p>
@@ -5563,7 +5563,7 @@
           <a:p>
             <a:fld id="{9FE723E2-BC0F-4A2F-84D1-E095482B85E6}" type="datetimeFigureOut">
               <a:rPr lang="en-CA" smtClean="0"/>
-              <a:t>2020-09-28</a:t>
+              <a:t>2020-10-05</a:t>
             </a:fld>
             <a:endParaRPr lang="en-CA"/>
           </a:p>
@@ -6239,18 +6239,26 @@
                   <a:prstClr val="white"/>
                 </a:solidFill>
               </a:rPr>
-              <a:t>Questions should be asked to </a:t>
-            </a:r>
-            <a:r>
-              <a:rPr lang="en-CA" sz="3200" b="1" dirty="0">
+              <a:t>Questions should be asked </a:t>
+            </a:r>
+            <a:r>
+              <a:rPr lang="en-CA" sz="3200" b="1">
+                <a:solidFill>
+                  <a:prstClr val="white"/>
+                </a:solidFill>
+              </a:rPr>
+              <a:t>to </a:t>
+            </a:r>
+            <a:r>
+              <a:rPr lang="en-CA" sz="3200" b="1">
                 <a:solidFill>
                   <a:srgbClr val="FF0000"/>
                 </a:solidFill>
               </a:rPr>
-              <a:t>Kyle</a:t>
-            </a:r>
-            <a:r>
-              <a:rPr lang="en-CA" sz="3200" b="1" dirty="0">
+              <a:t>Marcos</a:t>
+            </a:r>
+            <a:r>
+              <a:rPr lang="en-CA" sz="3200" b="1">
                 <a:solidFill>
                   <a:prstClr val="white"/>
                 </a:solidFill>

</xml_diff>

<commit_message>
updates for next week
</commit_message>
<xml_diff>
--- a/MSOSS_title.pptx
+++ b/MSOSS_title.pptx
@@ -298,7 +298,7 @@
           <a:p>
             <a:fld id="{9FE723E2-BC0F-4A2F-84D1-E095482B85E6}" type="datetimeFigureOut">
               <a:rPr lang="en-CA" smtClean="0"/>
-              <a:t>2020-10-05</a:t>
+              <a:t>2020-11-09</a:t>
             </a:fld>
             <a:endParaRPr lang="en-CA"/>
           </a:p>
@@ -573,7 +573,7 @@
           <a:p>
             <a:fld id="{9FE723E2-BC0F-4A2F-84D1-E095482B85E6}" type="datetimeFigureOut">
               <a:rPr lang="en-CA" smtClean="0"/>
-              <a:t>2020-10-05</a:t>
+              <a:t>2020-11-09</a:t>
             </a:fld>
             <a:endParaRPr lang="en-CA"/>
           </a:p>
@@ -767,7 +767,7 @@
           <a:p>
             <a:fld id="{9FE723E2-BC0F-4A2F-84D1-E095482B85E6}" type="datetimeFigureOut">
               <a:rPr lang="en-CA" smtClean="0"/>
-              <a:t>2020-10-05</a:t>
+              <a:t>2020-11-09</a:t>
             </a:fld>
             <a:endParaRPr lang="en-CA"/>
           </a:p>
@@ -1040,7 +1040,7 @@
           <a:p>
             <a:fld id="{9FE723E2-BC0F-4A2F-84D1-E095482B85E6}" type="datetimeFigureOut">
               <a:rPr lang="en-CA" smtClean="0"/>
-              <a:t>2020-10-05</a:t>
+              <a:t>2020-11-09</a:t>
             </a:fld>
             <a:endParaRPr lang="en-CA"/>
           </a:p>
@@ -1381,7 +1381,7 @@
           <a:p>
             <a:fld id="{9FE723E2-BC0F-4A2F-84D1-E095482B85E6}" type="datetimeFigureOut">
               <a:rPr lang="en-CA" smtClean="0"/>
-              <a:t>2020-10-05</a:t>
+              <a:t>2020-11-09</a:t>
             </a:fld>
             <a:endParaRPr lang="en-CA"/>
           </a:p>
@@ -2004,7 +2004,7 @@
           <a:p>
             <a:fld id="{9FE723E2-BC0F-4A2F-84D1-E095482B85E6}" type="datetimeFigureOut">
               <a:rPr lang="en-CA" smtClean="0"/>
-              <a:t>2020-10-05</a:t>
+              <a:t>2020-11-09</a:t>
             </a:fld>
             <a:endParaRPr lang="en-CA"/>
           </a:p>
@@ -2864,7 +2864,7 @@
           <a:p>
             <a:fld id="{9FE723E2-BC0F-4A2F-84D1-E095482B85E6}" type="datetimeFigureOut">
               <a:rPr lang="en-CA" smtClean="0"/>
-              <a:t>2020-10-05</a:t>
+              <a:t>2020-11-09</a:t>
             </a:fld>
             <a:endParaRPr lang="en-CA"/>
           </a:p>
@@ -3034,7 +3034,7 @@
           <a:p>
             <a:fld id="{9FE723E2-BC0F-4A2F-84D1-E095482B85E6}" type="datetimeFigureOut">
               <a:rPr lang="en-CA" smtClean="0"/>
-              <a:t>2020-10-05</a:t>
+              <a:t>2020-11-09</a:t>
             </a:fld>
             <a:endParaRPr lang="en-CA"/>
           </a:p>
@@ -3214,7 +3214,7 @@
           <a:p>
             <a:fld id="{9FE723E2-BC0F-4A2F-84D1-E095482B85E6}" type="datetimeFigureOut">
               <a:rPr lang="en-CA" smtClean="0"/>
-              <a:t>2020-10-05</a:t>
+              <a:t>2020-11-09</a:t>
             </a:fld>
             <a:endParaRPr lang="en-CA"/>
           </a:p>
@@ -3384,7 +3384,7 @@
           <a:p>
             <a:fld id="{9FE723E2-BC0F-4A2F-84D1-E095482B85E6}" type="datetimeFigureOut">
               <a:rPr lang="en-CA" smtClean="0"/>
-              <a:t>2020-10-05</a:t>
+              <a:t>2020-11-09</a:t>
             </a:fld>
             <a:endParaRPr lang="en-CA"/>
           </a:p>
@@ -3631,7 +3631,7 @@
           <a:p>
             <a:fld id="{9FE723E2-BC0F-4A2F-84D1-E095482B85E6}" type="datetimeFigureOut">
               <a:rPr lang="en-CA" smtClean="0"/>
-              <a:t>2020-10-05</a:t>
+              <a:t>2020-11-09</a:t>
             </a:fld>
             <a:endParaRPr lang="en-CA"/>
           </a:p>
@@ -3923,7 +3923,7 @@
           <a:p>
             <a:fld id="{9FE723E2-BC0F-4A2F-84D1-E095482B85E6}" type="datetimeFigureOut">
               <a:rPr lang="en-CA" smtClean="0"/>
-              <a:t>2020-10-05</a:t>
+              <a:t>2020-11-09</a:t>
             </a:fld>
             <a:endParaRPr lang="en-CA"/>
           </a:p>
@@ -4367,7 +4367,7 @@
           <a:p>
             <a:fld id="{9FE723E2-BC0F-4A2F-84D1-E095482B85E6}" type="datetimeFigureOut">
               <a:rPr lang="en-CA" smtClean="0"/>
-              <a:t>2020-10-05</a:t>
+              <a:t>2020-11-09</a:t>
             </a:fld>
             <a:endParaRPr lang="en-CA"/>
           </a:p>
@@ -4485,7 +4485,7 @@
           <a:p>
             <a:fld id="{9FE723E2-BC0F-4A2F-84D1-E095482B85E6}" type="datetimeFigureOut">
               <a:rPr lang="en-CA" smtClean="0"/>
-              <a:t>2020-10-05</a:t>
+              <a:t>2020-11-09</a:t>
             </a:fld>
             <a:endParaRPr lang="en-CA"/>
           </a:p>
@@ -4580,7 +4580,7 @@
           <a:p>
             <a:fld id="{9FE723E2-BC0F-4A2F-84D1-E095482B85E6}" type="datetimeFigureOut">
               <a:rPr lang="en-CA" smtClean="0"/>
-              <a:t>2020-10-05</a:t>
+              <a:t>2020-11-09</a:t>
             </a:fld>
             <a:endParaRPr lang="en-CA"/>
           </a:p>
@@ -4859,7 +4859,7 @@
           <a:p>
             <a:fld id="{9FE723E2-BC0F-4A2F-84D1-E095482B85E6}" type="datetimeFigureOut">
               <a:rPr lang="en-CA" smtClean="0"/>
-              <a:t>2020-10-05</a:t>
+              <a:t>2020-11-09</a:t>
             </a:fld>
             <a:endParaRPr lang="en-CA"/>
           </a:p>
@@ -5134,7 +5134,7 @@
           <a:p>
             <a:fld id="{9FE723E2-BC0F-4A2F-84D1-E095482B85E6}" type="datetimeFigureOut">
               <a:rPr lang="en-CA" smtClean="0"/>
-              <a:t>2020-10-05</a:t>
+              <a:t>2020-11-09</a:t>
             </a:fld>
             <a:endParaRPr lang="en-CA"/>
           </a:p>
@@ -5563,7 +5563,7 @@
           <a:p>
             <a:fld id="{9FE723E2-BC0F-4A2F-84D1-E095482B85E6}" type="datetimeFigureOut">
               <a:rPr lang="en-CA" smtClean="0"/>
-              <a:t>2020-10-05</a:t>
+              <a:t>2020-11-09</a:t>
             </a:fld>
             <a:endParaRPr lang="en-CA"/>
           </a:p>
@@ -6239,26 +6239,18 @@
                   <a:prstClr val="white"/>
                 </a:solidFill>
               </a:rPr>
-              <a:t>Questions should be asked </a:t>
-            </a:r>
-            <a:r>
-              <a:rPr lang="en-CA" sz="3200" b="1">
-                <a:solidFill>
-                  <a:prstClr val="white"/>
-                </a:solidFill>
-              </a:rPr>
-              <a:t>to </a:t>
-            </a:r>
-            <a:r>
-              <a:rPr lang="en-CA" sz="3200" b="1">
+              <a:t>Questions should be asked to </a:t>
+            </a:r>
+            <a:r>
+              <a:rPr lang="en-CA" sz="3200" b="1" dirty="0">
                 <a:solidFill>
                   <a:srgbClr val="FF0000"/>
                 </a:solidFill>
               </a:rPr>
-              <a:t>Marcos</a:t>
-            </a:r>
-            <a:r>
-              <a:rPr lang="en-CA" sz="3200" b="1">
+              <a:t>Homayon</a:t>
+            </a:r>
+            <a:r>
+              <a:rPr lang="en-CA" sz="3200" b="1" dirty="0">
                 <a:solidFill>
                   <a:prstClr val="white"/>
                 </a:solidFill>

</xml_diff>

<commit_message>
Update for Jim's post
</commit_message>
<xml_diff>
--- a/MSOSS_title.pptx
+++ b/MSOSS_title.pptx
@@ -298,7 +298,7 @@
           <a:p>
             <a:fld id="{9FE723E2-BC0F-4A2F-84D1-E095482B85E6}" type="datetimeFigureOut">
               <a:rPr lang="en-CA" smtClean="0"/>
-              <a:t>2020-11-16</a:t>
+              <a:t>2020-11-23</a:t>
             </a:fld>
             <a:endParaRPr lang="en-CA"/>
           </a:p>
@@ -573,7 +573,7 @@
           <a:p>
             <a:fld id="{9FE723E2-BC0F-4A2F-84D1-E095482B85E6}" type="datetimeFigureOut">
               <a:rPr lang="en-CA" smtClean="0"/>
-              <a:t>2020-11-16</a:t>
+              <a:t>2020-11-23</a:t>
             </a:fld>
             <a:endParaRPr lang="en-CA"/>
           </a:p>
@@ -767,7 +767,7 @@
           <a:p>
             <a:fld id="{9FE723E2-BC0F-4A2F-84D1-E095482B85E6}" type="datetimeFigureOut">
               <a:rPr lang="en-CA" smtClean="0"/>
-              <a:t>2020-11-16</a:t>
+              <a:t>2020-11-23</a:t>
             </a:fld>
             <a:endParaRPr lang="en-CA"/>
           </a:p>
@@ -1040,7 +1040,7 @@
           <a:p>
             <a:fld id="{9FE723E2-BC0F-4A2F-84D1-E095482B85E6}" type="datetimeFigureOut">
               <a:rPr lang="en-CA" smtClean="0"/>
-              <a:t>2020-11-16</a:t>
+              <a:t>2020-11-23</a:t>
             </a:fld>
             <a:endParaRPr lang="en-CA"/>
           </a:p>
@@ -1381,7 +1381,7 @@
           <a:p>
             <a:fld id="{9FE723E2-BC0F-4A2F-84D1-E095482B85E6}" type="datetimeFigureOut">
               <a:rPr lang="en-CA" smtClean="0"/>
-              <a:t>2020-11-16</a:t>
+              <a:t>2020-11-23</a:t>
             </a:fld>
             <a:endParaRPr lang="en-CA"/>
           </a:p>
@@ -2004,7 +2004,7 @@
           <a:p>
             <a:fld id="{9FE723E2-BC0F-4A2F-84D1-E095482B85E6}" type="datetimeFigureOut">
               <a:rPr lang="en-CA" smtClean="0"/>
-              <a:t>2020-11-16</a:t>
+              <a:t>2020-11-23</a:t>
             </a:fld>
             <a:endParaRPr lang="en-CA"/>
           </a:p>
@@ -2864,7 +2864,7 @@
           <a:p>
             <a:fld id="{9FE723E2-BC0F-4A2F-84D1-E095482B85E6}" type="datetimeFigureOut">
               <a:rPr lang="en-CA" smtClean="0"/>
-              <a:t>2020-11-16</a:t>
+              <a:t>2020-11-23</a:t>
             </a:fld>
             <a:endParaRPr lang="en-CA"/>
           </a:p>
@@ -3034,7 +3034,7 @@
           <a:p>
             <a:fld id="{9FE723E2-BC0F-4A2F-84D1-E095482B85E6}" type="datetimeFigureOut">
               <a:rPr lang="en-CA" smtClean="0"/>
-              <a:t>2020-11-16</a:t>
+              <a:t>2020-11-23</a:t>
             </a:fld>
             <a:endParaRPr lang="en-CA"/>
           </a:p>
@@ -3214,7 +3214,7 @@
           <a:p>
             <a:fld id="{9FE723E2-BC0F-4A2F-84D1-E095482B85E6}" type="datetimeFigureOut">
               <a:rPr lang="en-CA" smtClean="0"/>
-              <a:t>2020-11-16</a:t>
+              <a:t>2020-11-23</a:t>
             </a:fld>
             <a:endParaRPr lang="en-CA"/>
           </a:p>
@@ -3384,7 +3384,7 @@
           <a:p>
             <a:fld id="{9FE723E2-BC0F-4A2F-84D1-E095482B85E6}" type="datetimeFigureOut">
               <a:rPr lang="en-CA" smtClean="0"/>
-              <a:t>2020-11-16</a:t>
+              <a:t>2020-11-23</a:t>
             </a:fld>
             <a:endParaRPr lang="en-CA"/>
           </a:p>
@@ -3631,7 +3631,7 @@
           <a:p>
             <a:fld id="{9FE723E2-BC0F-4A2F-84D1-E095482B85E6}" type="datetimeFigureOut">
               <a:rPr lang="en-CA" smtClean="0"/>
-              <a:t>2020-11-16</a:t>
+              <a:t>2020-11-23</a:t>
             </a:fld>
             <a:endParaRPr lang="en-CA"/>
           </a:p>
@@ -3923,7 +3923,7 @@
           <a:p>
             <a:fld id="{9FE723E2-BC0F-4A2F-84D1-E095482B85E6}" type="datetimeFigureOut">
               <a:rPr lang="en-CA" smtClean="0"/>
-              <a:t>2020-11-16</a:t>
+              <a:t>2020-11-23</a:t>
             </a:fld>
             <a:endParaRPr lang="en-CA"/>
           </a:p>
@@ -4367,7 +4367,7 @@
           <a:p>
             <a:fld id="{9FE723E2-BC0F-4A2F-84D1-E095482B85E6}" type="datetimeFigureOut">
               <a:rPr lang="en-CA" smtClean="0"/>
-              <a:t>2020-11-16</a:t>
+              <a:t>2020-11-23</a:t>
             </a:fld>
             <a:endParaRPr lang="en-CA"/>
           </a:p>
@@ -4485,7 +4485,7 @@
           <a:p>
             <a:fld id="{9FE723E2-BC0F-4A2F-84D1-E095482B85E6}" type="datetimeFigureOut">
               <a:rPr lang="en-CA" smtClean="0"/>
-              <a:t>2020-11-16</a:t>
+              <a:t>2020-11-23</a:t>
             </a:fld>
             <a:endParaRPr lang="en-CA"/>
           </a:p>
@@ -4580,7 +4580,7 @@
           <a:p>
             <a:fld id="{9FE723E2-BC0F-4A2F-84D1-E095482B85E6}" type="datetimeFigureOut">
               <a:rPr lang="en-CA" smtClean="0"/>
-              <a:t>2020-11-16</a:t>
+              <a:t>2020-11-23</a:t>
             </a:fld>
             <a:endParaRPr lang="en-CA"/>
           </a:p>
@@ -4859,7 +4859,7 @@
           <a:p>
             <a:fld id="{9FE723E2-BC0F-4A2F-84D1-E095482B85E6}" type="datetimeFigureOut">
               <a:rPr lang="en-CA" smtClean="0"/>
-              <a:t>2020-11-16</a:t>
+              <a:t>2020-11-23</a:t>
             </a:fld>
             <a:endParaRPr lang="en-CA"/>
           </a:p>
@@ -5134,7 +5134,7 @@
           <a:p>
             <a:fld id="{9FE723E2-BC0F-4A2F-84D1-E095482B85E6}" type="datetimeFigureOut">
               <a:rPr lang="en-CA" smtClean="0"/>
-              <a:t>2020-11-16</a:t>
+              <a:t>2020-11-23</a:t>
             </a:fld>
             <a:endParaRPr lang="en-CA"/>
           </a:p>
@@ -5563,7 +5563,7 @@
           <a:p>
             <a:fld id="{9FE723E2-BC0F-4A2F-84D1-E095482B85E6}" type="datetimeFigureOut">
               <a:rPr lang="en-CA" smtClean="0"/>
-              <a:t>2020-11-16</a:t>
+              <a:t>2020-11-23</a:t>
             </a:fld>
             <a:endParaRPr lang="en-CA"/>
           </a:p>
@@ -6247,7 +6247,7 @@
                   <a:srgbClr val="FF0000"/>
                 </a:solidFill>
               </a:rPr>
-              <a:t>Kyle</a:t>
+              <a:t>David</a:t>
             </a:r>
             <a:r>
               <a:rPr lang="en-CA" sz="3200" b="1" dirty="0">

</xml_diff>

<commit_message>
New Post for last seminar.
</commit_message>
<xml_diff>
--- a/MSOSS_title.pptx
+++ b/MSOSS_title.pptx
@@ -298,7 +298,7 @@
           <a:p>
             <a:fld id="{9FE723E2-BC0F-4A2F-84D1-E095482B85E6}" type="datetimeFigureOut">
               <a:rPr lang="en-CA" smtClean="0"/>
-              <a:t>2020-11-23</a:t>
+              <a:t>2020-11-30</a:t>
             </a:fld>
             <a:endParaRPr lang="en-CA"/>
           </a:p>
@@ -573,7 +573,7 @@
           <a:p>
             <a:fld id="{9FE723E2-BC0F-4A2F-84D1-E095482B85E6}" type="datetimeFigureOut">
               <a:rPr lang="en-CA" smtClean="0"/>
-              <a:t>2020-11-23</a:t>
+              <a:t>2020-11-30</a:t>
             </a:fld>
             <a:endParaRPr lang="en-CA"/>
           </a:p>
@@ -767,7 +767,7 @@
           <a:p>
             <a:fld id="{9FE723E2-BC0F-4A2F-84D1-E095482B85E6}" type="datetimeFigureOut">
               <a:rPr lang="en-CA" smtClean="0"/>
-              <a:t>2020-11-23</a:t>
+              <a:t>2020-11-30</a:t>
             </a:fld>
             <a:endParaRPr lang="en-CA"/>
           </a:p>
@@ -1040,7 +1040,7 @@
           <a:p>
             <a:fld id="{9FE723E2-BC0F-4A2F-84D1-E095482B85E6}" type="datetimeFigureOut">
               <a:rPr lang="en-CA" smtClean="0"/>
-              <a:t>2020-11-23</a:t>
+              <a:t>2020-11-30</a:t>
             </a:fld>
             <a:endParaRPr lang="en-CA"/>
           </a:p>
@@ -1381,7 +1381,7 @@
           <a:p>
             <a:fld id="{9FE723E2-BC0F-4A2F-84D1-E095482B85E6}" type="datetimeFigureOut">
               <a:rPr lang="en-CA" smtClean="0"/>
-              <a:t>2020-11-23</a:t>
+              <a:t>2020-11-30</a:t>
             </a:fld>
             <a:endParaRPr lang="en-CA"/>
           </a:p>
@@ -2004,7 +2004,7 @@
           <a:p>
             <a:fld id="{9FE723E2-BC0F-4A2F-84D1-E095482B85E6}" type="datetimeFigureOut">
               <a:rPr lang="en-CA" smtClean="0"/>
-              <a:t>2020-11-23</a:t>
+              <a:t>2020-11-30</a:t>
             </a:fld>
             <a:endParaRPr lang="en-CA"/>
           </a:p>
@@ -2864,7 +2864,7 @@
           <a:p>
             <a:fld id="{9FE723E2-BC0F-4A2F-84D1-E095482B85E6}" type="datetimeFigureOut">
               <a:rPr lang="en-CA" smtClean="0"/>
-              <a:t>2020-11-23</a:t>
+              <a:t>2020-11-30</a:t>
             </a:fld>
             <a:endParaRPr lang="en-CA"/>
           </a:p>
@@ -3034,7 +3034,7 @@
           <a:p>
             <a:fld id="{9FE723E2-BC0F-4A2F-84D1-E095482B85E6}" type="datetimeFigureOut">
               <a:rPr lang="en-CA" smtClean="0"/>
-              <a:t>2020-11-23</a:t>
+              <a:t>2020-11-30</a:t>
             </a:fld>
             <a:endParaRPr lang="en-CA"/>
           </a:p>
@@ -3214,7 +3214,7 @@
           <a:p>
             <a:fld id="{9FE723E2-BC0F-4A2F-84D1-E095482B85E6}" type="datetimeFigureOut">
               <a:rPr lang="en-CA" smtClean="0"/>
-              <a:t>2020-11-23</a:t>
+              <a:t>2020-11-30</a:t>
             </a:fld>
             <a:endParaRPr lang="en-CA"/>
           </a:p>
@@ -3384,7 +3384,7 @@
           <a:p>
             <a:fld id="{9FE723E2-BC0F-4A2F-84D1-E095482B85E6}" type="datetimeFigureOut">
               <a:rPr lang="en-CA" smtClean="0"/>
-              <a:t>2020-11-23</a:t>
+              <a:t>2020-11-30</a:t>
             </a:fld>
             <a:endParaRPr lang="en-CA"/>
           </a:p>
@@ -3631,7 +3631,7 @@
           <a:p>
             <a:fld id="{9FE723E2-BC0F-4A2F-84D1-E095482B85E6}" type="datetimeFigureOut">
               <a:rPr lang="en-CA" smtClean="0"/>
-              <a:t>2020-11-23</a:t>
+              <a:t>2020-11-30</a:t>
             </a:fld>
             <a:endParaRPr lang="en-CA"/>
           </a:p>
@@ -3923,7 +3923,7 @@
           <a:p>
             <a:fld id="{9FE723E2-BC0F-4A2F-84D1-E095482B85E6}" type="datetimeFigureOut">
               <a:rPr lang="en-CA" smtClean="0"/>
-              <a:t>2020-11-23</a:t>
+              <a:t>2020-11-30</a:t>
             </a:fld>
             <a:endParaRPr lang="en-CA"/>
           </a:p>
@@ -4367,7 +4367,7 @@
           <a:p>
             <a:fld id="{9FE723E2-BC0F-4A2F-84D1-E095482B85E6}" type="datetimeFigureOut">
               <a:rPr lang="en-CA" smtClean="0"/>
-              <a:t>2020-11-23</a:t>
+              <a:t>2020-11-30</a:t>
             </a:fld>
             <a:endParaRPr lang="en-CA"/>
           </a:p>
@@ -4485,7 +4485,7 @@
           <a:p>
             <a:fld id="{9FE723E2-BC0F-4A2F-84D1-E095482B85E6}" type="datetimeFigureOut">
               <a:rPr lang="en-CA" smtClean="0"/>
-              <a:t>2020-11-23</a:t>
+              <a:t>2020-11-30</a:t>
             </a:fld>
             <a:endParaRPr lang="en-CA"/>
           </a:p>
@@ -4580,7 +4580,7 @@
           <a:p>
             <a:fld id="{9FE723E2-BC0F-4A2F-84D1-E095482B85E6}" type="datetimeFigureOut">
               <a:rPr lang="en-CA" smtClean="0"/>
-              <a:t>2020-11-23</a:t>
+              <a:t>2020-11-30</a:t>
             </a:fld>
             <a:endParaRPr lang="en-CA"/>
           </a:p>
@@ -4859,7 +4859,7 @@
           <a:p>
             <a:fld id="{9FE723E2-BC0F-4A2F-84D1-E095482B85E6}" type="datetimeFigureOut">
               <a:rPr lang="en-CA" smtClean="0"/>
-              <a:t>2020-11-23</a:t>
+              <a:t>2020-11-30</a:t>
             </a:fld>
             <a:endParaRPr lang="en-CA"/>
           </a:p>
@@ -5134,7 +5134,7 @@
           <a:p>
             <a:fld id="{9FE723E2-BC0F-4A2F-84D1-E095482B85E6}" type="datetimeFigureOut">
               <a:rPr lang="en-CA" smtClean="0"/>
-              <a:t>2020-11-23</a:t>
+              <a:t>2020-11-30</a:t>
             </a:fld>
             <a:endParaRPr lang="en-CA"/>
           </a:p>
@@ -5563,7 +5563,7 @@
           <a:p>
             <a:fld id="{9FE723E2-BC0F-4A2F-84D1-E095482B85E6}" type="datetimeFigureOut">
               <a:rPr lang="en-CA" smtClean="0"/>
-              <a:t>2020-11-23</a:t>
+              <a:t>2020-11-30</a:t>
             </a:fld>
             <a:endParaRPr lang="en-CA"/>
           </a:p>
@@ -6247,7 +6247,7 @@
                   <a:srgbClr val="FF0000"/>
                 </a:solidFill>
               </a:rPr>
-              <a:t>David</a:t>
+              <a:t>Marcos</a:t>
             </a:r>
             <a:r>
               <a:rPr lang="en-CA" sz="3200" b="1" dirty="0">

</xml_diff>

<commit_message>
Update for next talk
</commit_message>
<xml_diff>
--- a/MSOSS_title.pptx
+++ b/MSOSS_title.pptx
@@ -5,7 +5,8 @@
     <p:sldMasterId id="2147483696" r:id="rId1"/>
   </p:sldMasterIdLst>
   <p:sldIdLst>
-    <p:sldId id="256" r:id="rId2"/>
+    <p:sldId id="257" r:id="rId2"/>
+    <p:sldId id="256" r:id="rId3"/>
   </p:sldIdLst>
   <p:sldSz cx="12192000" cy="6858000"/>
   <p:notesSz cx="6858000" cy="9144000"/>
@@ -298,7 +299,7 @@
           <a:p>
             <a:fld id="{9FE723E2-BC0F-4A2F-84D1-E095482B85E6}" type="datetimeFigureOut">
               <a:rPr lang="en-CA" smtClean="0"/>
-              <a:t>2021-01-11</a:t>
+              <a:t>2021-08-31</a:t>
             </a:fld>
             <a:endParaRPr lang="en-CA"/>
           </a:p>
@@ -573,7 +574,7 @@
           <a:p>
             <a:fld id="{9FE723E2-BC0F-4A2F-84D1-E095482B85E6}" type="datetimeFigureOut">
               <a:rPr lang="en-CA" smtClean="0"/>
-              <a:t>2021-01-11</a:t>
+              <a:t>2021-08-31</a:t>
             </a:fld>
             <a:endParaRPr lang="en-CA"/>
           </a:p>
@@ -767,7 +768,7 @@
           <a:p>
             <a:fld id="{9FE723E2-BC0F-4A2F-84D1-E095482B85E6}" type="datetimeFigureOut">
               <a:rPr lang="en-CA" smtClean="0"/>
-              <a:t>2021-01-11</a:t>
+              <a:t>2021-08-31</a:t>
             </a:fld>
             <a:endParaRPr lang="en-CA"/>
           </a:p>
@@ -1040,7 +1041,7 @@
           <a:p>
             <a:fld id="{9FE723E2-BC0F-4A2F-84D1-E095482B85E6}" type="datetimeFigureOut">
               <a:rPr lang="en-CA" smtClean="0"/>
-              <a:t>2021-01-11</a:t>
+              <a:t>2021-08-31</a:t>
             </a:fld>
             <a:endParaRPr lang="en-CA"/>
           </a:p>
@@ -1381,7 +1382,7 @@
           <a:p>
             <a:fld id="{9FE723E2-BC0F-4A2F-84D1-E095482B85E6}" type="datetimeFigureOut">
               <a:rPr lang="en-CA" smtClean="0"/>
-              <a:t>2021-01-11</a:t>
+              <a:t>2021-08-31</a:t>
             </a:fld>
             <a:endParaRPr lang="en-CA"/>
           </a:p>
@@ -2004,7 +2005,7 @@
           <a:p>
             <a:fld id="{9FE723E2-BC0F-4A2F-84D1-E095482B85E6}" type="datetimeFigureOut">
               <a:rPr lang="en-CA" smtClean="0"/>
-              <a:t>2021-01-11</a:t>
+              <a:t>2021-08-31</a:t>
             </a:fld>
             <a:endParaRPr lang="en-CA"/>
           </a:p>
@@ -2864,7 +2865,7 @@
           <a:p>
             <a:fld id="{9FE723E2-BC0F-4A2F-84D1-E095482B85E6}" type="datetimeFigureOut">
               <a:rPr lang="en-CA" smtClean="0"/>
-              <a:t>2021-01-11</a:t>
+              <a:t>2021-08-31</a:t>
             </a:fld>
             <a:endParaRPr lang="en-CA"/>
           </a:p>
@@ -3034,7 +3035,7 @@
           <a:p>
             <a:fld id="{9FE723E2-BC0F-4A2F-84D1-E095482B85E6}" type="datetimeFigureOut">
               <a:rPr lang="en-CA" smtClean="0"/>
-              <a:t>2021-01-11</a:t>
+              <a:t>2021-08-31</a:t>
             </a:fld>
             <a:endParaRPr lang="en-CA"/>
           </a:p>
@@ -3214,7 +3215,7 @@
           <a:p>
             <a:fld id="{9FE723E2-BC0F-4A2F-84D1-E095482B85E6}" type="datetimeFigureOut">
               <a:rPr lang="en-CA" smtClean="0"/>
-              <a:t>2021-01-11</a:t>
+              <a:t>2021-08-31</a:t>
             </a:fld>
             <a:endParaRPr lang="en-CA"/>
           </a:p>
@@ -3384,7 +3385,7 @@
           <a:p>
             <a:fld id="{9FE723E2-BC0F-4A2F-84D1-E095482B85E6}" type="datetimeFigureOut">
               <a:rPr lang="en-CA" smtClean="0"/>
-              <a:t>2021-01-11</a:t>
+              <a:t>2021-08-31</a:t>
             </a:fld>
             <a:endParaRPr lang="en-CA"/>
           </a:p>
@@ -3631,7 +3632,7 @@
           <a:p>
             <a:fld id="{9FE723E2-BC0F-4A2F-84D1-E095482B85E6}" type="datetimeFigureOut">
               <a:rPr lang="en-CA" smtClean="0"/>
-              <a:t>2021-01-11</a:t>
+              <a:t>2021-08-31</a:t>
             </a:fld>
             <a:endParaRPr lang="en-CA"/>
           </a:p>
@@ -3923,7 +3924,7 @@
           <a:p>
             <a:fld id="{9FE723E2-BC0F-4A2F-84D1-E095482B85E6}" type="datetimeFigureOut">
               <a:rPr lang="en-CA" smtClean="0"/>
-              <a:t>2021-01-11</a:t>
+              <a:t>2021-08-31</a:t>
             </a:fld>
             <a:endParaRPr lang="en-CA"/>
           </a:p>
@@ -4367,7 +4368,7 @@
           <a:p>
             <a:fld id="{9FE723E2-BC0F-4A2F-84D1-E095482B85E6}" type="datetimeFigureOut">
               <a:rPr lang="en-CA" smtClean="0"/>
-              <a:t>2021-01-11</a:t>
+              <a:t>2021-08-31</a:t>
             </a:fld>
             <a:endParaRPr lang="en-CA"/>
           </a:p>
@@ -4485,7 +4486,7 @@
           <a:p>
             <a:fld id="{9FE723E2-BC0F-4A2F-84D1-E095482B85E6}" type="datetimeFigureOut">
               <a:rPr lang="en-CA" smtClean="0"/>
-              <a:t>2021-01-11</a:t>
+              <a:t>2021-08-31</a:t>
             </a:fld>
             <a:endParaRPr lang="en-CA"/>
           </a:p>
@@ -4580,7 +4581,7 @@
           <a:p>
             <a:fld id="{9FE723E2-BC0F-4A2F-84D1-E095482B85E6}" type="datetimeFigureOut">
               <a:rPr lang="en-CA" smtClean="0"/>
-              <a:t>2021-01-11</a:t>
+              <a:t>2021-08-31</a:t>
             </a:fld>
             <a:endParaRPr lang="en-CA"/>
           </a:p>
@@ -4859,7 +4860,7 @@
           <a:p>
             <a:fld id="{9FE723E2-BC0F-4A2F-84D1-E095482B85E6}" type="datetimeFigureOut">
               <a:rPr lang="en-CA" smtClean="0"/>
-              <a:t>2021-01-11</a:t>
+              <a:t>2021-08-31</a:t>
             </a:fld>
             <a:endParaRPr lang="en-CA"/>
           </a:p>
@@ -5134,7 +5135,7 @@
           <a:p>
             <a:fld id="{9FE723E2-BC0F-4A2F-84D1-E095482B85E6}" type="datetimeFigureOut">
               <a:rPr lang="en-CA" smtClean="0"/>
-              <a:t>2021-01-11</a:t>
+              <a:t>2021-08-31</a:t>
             </a:fld>
             <a:endParaRPr lang="en-CA"/>
           </a:p>
@@ -5563,7 +5564,7 @@
           <a:p>
             <a:fld id="{9FE723E2-BC0F-4A2F-84D1-E095482B85E6}" type="datetimeFigureOut">
               <a:rPr lang="en-CA" smtClean="0"/>
-              <a:t>2021-01-11</a:t>
+              <a:t>2021-08-31</a:t>
             </a:fld>
             <a:endParaRPr lang="en-CA"/>
           </a:p>
@@ -6077,6 +6078,524 @@
 <file path=ppt/slides/slide1.xml><?xml version="1.0" encoding="utf-8"?>
 <p:sld xmlns:a="http://schemas.openxmlformats.org/drawingml/2006/main" xmlns:r="http://schemas.openxmlformats.org/officeDocument/2006/relationships" xmlns:p="http://schemas.openxmlformats.org/presentationml/2006/main">
   <p:cSld>
+    <p:bg>
+      <p:bgPr>
+        <a:blipFill rotWithShape="1">
+          <a:blip r:embed="rId2">
+            <a:duotone>
+              <a:schemeClr val="bg2">
+                <a:shade val="69000"/>
+                <a:hueMod val="108000"/>
+                <a:satMod val="164000"/>
+                <a:lumMod val="74000"/>
+              </a:schemeClr>
+              <a:schemeClr val="bg2">
+                <a:tint val="96000"/>
+                <a:hueMod val="88000"/>
+                <a:satMod val="140000"/>
+                <a:lumMod val="132000"/>
+              </a:schemeClr>
+            </a:duotone>
+          </a:blip>
+          <a:stretch/>
+        </a:blipFill>
+        <a:effectLst/>
+      </p:bgPr>
+    </p:bg>
+    <p:spTree>
+      <p:nvGrpSpPr>
+        <p:cNvPr id="1" name=""/>
+        <p:cNvGrpSpPr/>
+        <p:nvPr/>
+      </p:nvGrpSpPr>
+      <p:grpSpPr>
+        <a:xfrm>
+          <a:off x="0" y="0"/>
+          <a:ext cx="0" cy="0"/>
+          <a:chOff x="0" y="0"/>
+          <a:chExt cx="0" cy="0"/>
+        </a:xfrm>
+      </p:grpSpPr>
+      <p:pic>
+        <p:nvPicPr>
+          <p:cNvPr id="6" name="Content Placeholder 5" descr="A picture containing invertebrate, coelenterate, hydrozoan&#10;&#10;Description automatically generated">
+            <a:extLst>
+              <a:ext uri="{FF2B5EF4-FFF2-40B4-BE49-F238E27FC236}">
+                <a16:creationId xmlns:a16="http://schemas.microsoft.com/office/drawing/2014/main" id="{C56775F6-B24A-4FD3-9B62-3F3516F0304C}"/>
+              </a:ext>
+            </a:extLst>
+          </p:cNvPr>
+          <p:cNvPicPr>
+            <a:picLocks noGrp="1" noChangeAspect="1"/>
+          </p:cNvPicPr>
+          <p:nvPr>
+            <p:ph sz="half" idx="4294967295"/>
+          </p:nvPr>
+        </p:nvPicPr>
+        <p:blipFill rotWithShape="1">
+          <a:blip r:embed="rId3">
+            <a:alphaModFix/>
+            <a:extLst>
+              <a:ext uri="{28A0092B-C50C-407E-A947-70E740481C1C}">
+                <a14:useLocalDpi xmlns:a14="http://schemas.microsoft.com/office/drawing/2010/main" val="0"/>
+              </a:ext>
+            </a:extLst>
+          </a:blip>
+          <a:srcRect t="5027" r="9091" b="4064"/>
+          <a:stretch/>
+        </p:blipFill>
+        <p:spPr>
+          <a:xfrm>
+            <a:off x="0" y="0"/>
+            <a:ext cx="12192000" cy="6858000"/>
+          </a:xfrm>
+          <a:prstGeom prst="rect">
+            <a:avLst/>
+          </a:prstGeom>
+        </p:spPr>
+      </p:pic>
+      <p:sp>
+        <p:nvSpPr>
+          <p:cNvPr id="16" name="Title 3">
+            <a:extLst>
+              <a:ext uri="{FF2B5EF4-FFF2-40B4-BE49-F238E27FC236}">
+                <a16:creationId xmlns:a16="http://schemas.microsoft.com/office/drawing/2014/main" id="{C66FFF6D-FB56-4ED8-B121-41112B83D11B}"/>
+              </a:ext>
+            </a:extLst>
+          </p:cNvPr>
+          <p:cNvSpPr txBox="1">
+            <a:spLocks/>
+          </p:cNvSpPr>
+          <p:nvPr/>
+        </p:nvSpPr>
+        <p:spPr>
+          <a:xfrm>
+            <a:off x="2146362" y="120601"/>
+            <a:ext cx="9786139" cy="756729"/>
+          </a:xfrm>
+          <a:prstGeom prst="rect">
+            <a:avLst/>
+          </a:prstGeom>
+        </p:spPr>
+        <p:txBody>
+          <a:bodyPr vert="horz" lIns="91440" tIns="45720" rIns="91440" bIns="45720" rtlCol="0" anchor="b">
+            <a:normAutofit fontScale="97500"/>
+          </a:bodyPr>
+          <a:lstStyle>
+            <a:lvl1pPr algn="l" defTabSz="457200" rtl="0" eaLnBrk="1" latinLnBrk="0" hangingPunct="1">
+              <a:spcBef>
+                <a:spcPct val="0"/>
+              </a:spcBef>
+              <a:buNone/>
+              <a:defRPr sz="7200" b="0" i="0" kern="1200">
+                <a:solidFill>
+                  <a:schemeClr val="tx2"/>
+                </a:solidFill>
+                <a:latin typeface="+mj-lt"/>
+                <a:ea typeface="+mj-ea"/>
+                <a:cs typeface="+mj-cs"/>
+              </a:defRPr>
+            </a:lvl1pPr>
+            <a:lvl2pPr eaLnBrk="1" hangingPunct="1">
+              <a:defRPr>
+                <a:solidFill>
+                  <a:schemeClr val="tx2"/>
+                </a:solidFill>
+              </a:defRPr>
+            </a:lvl2pPr>
+            <a:lvl3pPr eaLnBrk="1" hangingPunct="1">
+              <a:defRPr>
+                <a:solidFill>
+                  <a:schemeClr val="tx2"/>
+                </a:solidFill>
+              </a:defRPr>
+            </a:lvl3pPr>
+            <a:lvl4pPr eaLnBrk="1" hangingPunct="1">
+              <a:defRPr>
+                <a:solidFill>
+                  <a:schemeClr val="tx2"/>
+                </a:solidFill>
+              </a:defRPr>
+            </a:lvl4pPr>
+            <a:lvl5pPr eaLnBrk="1" hangingPunct="1">
+              <a:defRPr>
+                <a:solidFill>
+                  <a:schemeClr val="tx2"/>
+                </a:solidFill>
+              </a:defRPr>
+            </a:lvl5pPr>
+            <a:lvl6pPr eaLnBrk="1" hangingPunct="1">
+              <a:defRPr>
+                <a:solidFill>
+                  <a:schemeClr val="tx2"/>
+                </a:solidFill>
+              </a:defRPr>
+            </a:lvl6pPr>
+            <a:lvl7pPr eaLnBrk="1" hangingPunct="1">
+              <a:defRPr>
+                <a:solidFill>
+                  <a:schemeClr val="tx2"/>
+                </a:solidFill>
+              </a:defRPr>
+            </a:lvl7pPr>
+            <a:lvl8pPr eaLnBrk="1" hangingPunct="1">
+              <a:defRPr>
+                <a:solidFill>
+                  <a:schemeClr val="tx2"/>
+                </a:solidFill>
+              </a:defRPr>
+            </a:lvl8pPr>
+            <a:lvl9pPr eaLnBrk="1" hangingPunct="1">
+              <a:defRPr>
+                <a:solidFill>
+                  <a:schemeClr val="tx2"/>
+                </a:solidFill>
+              </a:defRPr>
+            </a:lvl9pPr>
+          </a:lstStyle>
+          <a:p>
+            <a:pPr algn="r"/>
+            <a:r>
+              <a:rPr lang="en-CA" sz="4000" b="1" dirty="0">
+                <a:effectLst>
+                  <a:glow rad="139700">
+                    <a:schemeClr val="tx1">
+                      <a:lumMod val="50000"/>
+                      <a:alpha val="40000"/>
+                    </a:schemeClr>
+                  </a:glow>
+                </a:effectLst>
+              </a:rPr>
+              <a:t>Magnetosphere Online Seminar Series</a:t>
+            </a:r>
+            <a:endParaRPr lang="en-CA" sz="4000" dirty="0">
+              <a:effectLst>
+                <a:glow rad="139700">
+                  <a:schemeClr val="tx1">
+                    <a:lumMod val="50000"/>
+                    <a:alpha val="40000"/>
+                  </a:schemeClr>
+                </a:glow>
+              </a:effectLst>
+            </a:endParaRPr>
+          </a:p>
+        </p:txBody>
+      </p:sp>
+      <p:sp>
+        <p:nvSpPr>
+          <p:cNvPr id="22" name="Freeform: Shape 21">
+            <a:extLst>
+              <a:ext uri="{FF2B5EF4-FFF2-40B4-BE49-F238E27FC236}">
+                <a16:creationId xmlns:a16="http://schemas.microsoft.com/office/drawing/2014/main" id="{653DF944-DB62-4B7A-88AD-9E5A6D658006}"/>
+              </a:ext>
+            </a:extLst>
+          </p:cNvPr>
+          <p:cNvSpPr/>
+          <p:nvPr/>
+        </p:nvSpPr>
+        <p:spPr>
+          <a:xfrm>
+            <a:off x="6981568" y="2117414"/>
+            <a:ext cx="5210432" cy="4740586"/>
+          </a:xfrm>
+          <a:custGeom>
+            <a:avLst/>
+            <a:gdLst>
+              <a:gd name="connsiteX0" fmla="*/ 2738005 w 5250873"/>
+              <a:gd name="connsiteY0" fmla="*/ 0 h 4777380"/>
+              <a:gd name="connsiteX1" fmla="*/ 5145547 w 5250873"/>
+              <a:gd name="connsiteY1" fmla="*/ 1328354 h 4777380"/>
+              <a:gd name="connsiteX2" fmla="*/ 5250873 w 5250873"/>
+              <a:gd name="connsiteY2" fmla="*/ 1531043 h 4777380"/>
+              <a:gd name="connsiteX3" fmla="*/ 5250873 w 5250873"/>
+              <a:gd name="connsiteY3" fmla="*/ 3545400 h 4777380"/>
+              <a:gd name="connsiteX4" fmla="*/ 5145547 w 5250873"/>
+              <a:gd name="connsiteY4" fmla="*/ 3748088 h 4777380"/>
+              <a:gd name="connsiteX5" fmla="*/ 4043101 w 5250873"/>
+              <a:gd name="connsiteY5" fmla="*/ 4770093 h 4777380"/>
+              <a:gd name="connsiteX6" fmla="*/ 4026782 w 5250873"/>
+              <a:gd name="connsiteY6" fmla="*/ 4777380 h 4777380"/>
+              <a:gd name="connsiteX7" fmla="*/ 1449228 w 5250873"/>
+              <a:gd name="connsiteY7" fmla="*/ 4777380 h 4777380"/>
+              <a:gd name="connsiteX8" fmla="*/ 1432910 w 5250873"/>
+              <a:gd name="connsiteY8" fmla="*/ 4770093 h 4777380"/>
+              <a:gd name="connsiteX9" fmla="*/ 0 w 5250873"/>
+              <a:gd name="connsiteY9" fmla="*/ 2538221 h 4777380"/>
+              <a:gd name="connsiteX10" fmla="*/ 2738005 w 5250873"/>
+              <a:gd name="connsiteY10" fmla="*/ 0 h 4777380"/>
+            </a:gdLst>
+            <a:ahLst/>
+            <a:cxnLst>
+              <a:cxn ang="0">
+                <a:pos x="connsiteX0" y="connsiteY0"/>
+              </a:cxn>
+              <a:cxn ang="0">
+                <a:pos x="connsiteX1" y="connsiteY1"/>
+              </a:cxn>
+              <a:cxn ang="0">
+                <a:pos x="connsiteX2" y="connsiteY2"/>
+              </a:cxn>
+              <a:cxn ang="0">
+                <a:pos x="connsiteX3" y="connsiteY3"/>
+              </a:cxn>
+              <a:cxn ang="0">
+                <a:pos x="connsiteX4" y="connsiteY4"/>
+              </a:cxn>
+              <a:cxn ang="0">
+                <a:pos x="connsiteX5" y="connsiteY5"/>
+              </a:cxn>
+              <a:cxn ang="0">
+                <a:pos x="connsiteX6" y="connsiteY6"/>
+              </a:cxn>
+              <a:cxn ang="0">
+                <a:pos x="connsiteX7" y="connsiteY7"/>
+              </a:cxn>
+              <a:cxn ang="0">
+                <a:pos x="connsiteX8" y="connsiteY8"/>
+              </a:cxn>
+              <a:cxn ang="0">
+                <a:pos x="connsiteX9" y="connsiteY9"/>
+              </a:cxn>
+              <a:cxn ang="0">
+                <a:pos x="connsiteX10" y="connsiteY10"/>
+              </a:cxn>
+            </a:cxnLst>
+            <a:rect l="l" t="t" r="r" b="b"/>
+            <a:pathLst>
+              <a:path w="5250873" h="4777380">
+                <a:moveTo>
+                  <a:pt x="2738005" y="0"/>
+                </a:moveTo>
+                <a:cubicBezTo>
+                  <a:pt x="3777614" y="0"/>
+                  <a:pt x="4681896" y="537127"/>
+                  <a:pt x="5145547" y="1328354"/>
+                </a:cubicBezTo>
+                <a:lnTo>
+                  <a:pt x="5250873" y="1531043"/>
+                </a:lnTo>
+                <a:lnTo>
+                  <a:pt x="5250873" y="3545400"/>
+                </a:lnTo>
+                <a:lnTo>
+                  <a:pt x="5145547" y="3748088"/>
+                </a:lnTo>
+                <a:cubicBezTo>
+                  <a:pt x="4892646" y="4179667"/>
+                  <a:pt x="4508649" y="4535645"/>
+                  <a:pt x="4043101" y="4770093"/>
+                </a:cubicBezTo>
+                <a:lnTo>
+                  <a:pt x="4026782" y="4777380"/>
+                </a:lnTo>
+                <a:lnTo>
+                  <a:pt x="1449228" y="4777380"/>
+                </a:lnTo>
+                <a:lnTo>
+                  <a:pt x="1432910" y="4770093"/>
+                </a:lnTo>
+                <a:cubicBezTo>
+                  <a:pt x="579405" y="4340272"/>
+                  <a:pt x="0" y="3501973"/>
+                  <a:pt x="0" y="2538221"/>
+                </a:cubicBezTo>
+                <a:cubicBezTo>
+                  <a:pt x="0" y="1136400"/>
+                  <a:pt x="1225847" y="0"/>
+                  <a:pt x="2738005" y="0"/>
+                </a:cubicBezTo>
+                <a:close/>
+              </a:path>
+            </a:pathLst>
+          </a:custGeom>
+          <a:solidFill>
+            <a:schemeClr val="tx1">
+              <a:lumMod val="65000"/>
+              <a:alpha val="76000"/>
+            </a:schemeClr>
+          </a:solidFill>
+          <a:ln>
+            <a:noFill/>
+          </a:ln>
+        </p:spPr>
+        <p:style>
+          <a:lnRef idx="2">
+            <a:schemeClr val="accent1">
+              <a:shade val="50000"/>
+            </a:schemeClr>
+          </a:lnRef>
+          <a:fillRef idx="1">
+            <a:schemeClr val="accent1"/>
+          </a:fillRef>
+          <a:effectRef idx="0">
+            <a:schemeClr val="accent1"/>
+          </a:effectRef>
+          <a:fontRef idx="minor">
+            <a:schemeClr val="lt1"/>
+          </a:fontRef>
+        </p:style>
+        <p:txBody>
+          <a:bodyPr wrap="square" rtlCol="0" anchor="ctr">
+            <a:noAutofit/>
+          </a:bodyPr>
+          <a:lstStyle/>
+          <a:p>
+            <a:pPr algn="ctr"/>
+            <a:endParaRPr lang="en-CA"/>
+          </a:p>
+        </p:txBody>
+      </p:sp>
+      <p:sp>
+        <p:nvSpPr>
+          <p:cNvPr id="9" name="Title 8">
+            <a:extLst>
+              <a:ext uri="{FF2B5EF4-FFF2-40B4-BE49-F238E27FC236}">
+                <a16:creationId xmlns:a16="http://schemas.microsoft.com/office/drawing/2014/main" id="{6FDCB601-E00A-48CC-AEDE-3B816A4304A2}"/>
+              </a:ext>
+            </a:extLst>
+          </p:cNvPr>
+          <p:cNvSpPr>
+            <a:spLocks noGrp="1"/>
+          </p:cNvSpPr>
+          <p:nvPr>
+            <p:ph type="ctrTitle"/>
+          </p:nvPr>
+        </p:nvSpPr>
+        <p:spPr>
+          <a:xfrm>
+            <a:off x="7241067" y="2539490"/>
+            <a:ext cx="4950933" cy="2765725"/>
+          </a:xfrm>
+        </p:spPr>
+        <p:txBody>
+          <a:bodyPr/>
+          <a:lstStyle/>
+          <a:p>
+            <a:pPr algn="ctr"/>
+            <a:r>
+              <a:rPr lang="en-CA" sz="5400" b="1" dirty="0">
+                <a:solidFill>
+                  <a:schemeClr val="bg1"/>
+                </a:solidFill>
+                <a:latin typeface="Myriad Pro Cond" panose="020B0506030403020204" pitchFamily="34" charset="0"/>
+              </a:rPr>
+              <a:t>Lauren Blum</a:t>
+            </a:r>
+            <a:br>
+              <a:rPr lang="en-CA" sz="5400" b="1" dirty="0">
+                <a:solidFill>
+                  <a:schemeClr val="bg1"/>
+                </a:solidFill>
+                <a:latin typeface="Myriad Pro Cond" panose="020B0506030403020204" pitchFamily="34" charset="0"/>
+              </a:rPr>
+            </a:br>
+            <a:r>
+              <a:rPr lang="en-CA" sz="5400" dirty="0">
+                <a:solidFill>
+                  <a:schemeClr val="bg1"/>
+                </a:solidFill>
+                <a:latin typeface="Myriad Pro Cond" panose="020B0506030403020204" pitchFamily="34" charset="0"/>
+              </a:rPr>
+              <a:t>Energetic Particle Precipitation</a:t>
+            </a:r>
+          </a:p>
+        </p:txBody>
+      </p:sp>
+      <p:sp>
+        <p:nvSpPr>
+          <p:cNvPr id="12" name="Subtitle 11">
+            <a:extLst>
+              <a:ext uri="{FF2B5EF4-FFF2-40B4-BE49-F238E27FC236}">
+                <a16:creationId xmlns:a16="http://schemas.microsoft.com/office/drawing/2014/main" id="{206D4F79-07E6-410D-87B5-76C84382B1D3}"/>
+              </a:ext>
+            </a:extLst>
+          </p:cNvPr>
+          <p:cNvSpPr>
+            <a:spLocks noGrp="1"/>
+          </p:cNvSpPr>
+          <p:nvPr>
+            <p:ph type="subTitle" idx="1"/>
+          </p:nvPr>
+        </p:nvSpPr>
+        <p:spPr>
+          <a:xfrm>
+            <a:off x="8304159" y="5789080"/>
+            <a:ext cx="2824748" cy="525223"/>
+          </a:xfrm>
+        </p:spPr>
+        <p:txBody>
+          <a:bodyPr>
+            <a:normAutofit fontScale="92500"/>
+          </a:bodyPr>
+          <a:lstStyle/>
+          <a:p>
+            <a:pPr algn="ctr"/>
+            <a:r>
+              <a:rPr lang="en-CA" sz="2400" b="1" dirty="0">
+                <a:solidFill>
+                  <a:schemeClr val="bg1"/>
+                </a:solidFill>
+              </a:rPr>
+              <a:t>September 13, 2021</a:t>
+            </a:r>
+          </a:p>
+        </p:txBody>
+      </p:sp>
+      <p:cxnSp>
+        <p:nvCxnSpPr>
+          <p:cNvPr id="24" name="Straight Connector 23">
+            <a:extLst>
+              <a:ext uri="{FF2B5EF4-FFF2-40B4-BE49-F238E27FC236}">
+                <a16:creationId xmlns:a16="http://schemas.microsoft.com/office/drawing/2014/main" id="{049626B3-74F3-4977-A89B-A9B6A8BC2215}"/>
+              </a:ext>
+            </a:extLst>
+          </p:cNvPr>
+          <p:cNvCxnSpPr>
+            <a:cxnSpLocks/>
+          </p:cNvCxnSpPr>
+          <p:nvPr/>
+        </p:nvCxnSpPr>
+        <p:spPr>
+          <a:xfrm>
+            <a:off x="8128690" y="5490570"/>
+            <a:ext cx="3175686" cy="0"/>
+          </a:xfrm>
+          <a:prstGeom prst="line">
+            <a:avLst/>
+          </a:prstGeom>
+          <a:ln w="38100"/>
+        </p:spPr>
+        <p:style>
+          <a:lnRef idx="1">
+            <a:schemeClr val="dk1"/>
+          </a:lnRef>
+          <a:fillRef idx="0">
+            <a:schemeClr val="dk1"/>
+          </a:fillRef>
+          <a:effectRef idx="0">
+            <a:schemeClr val="dk1"/>
+          </a:effectRef>
+          <a:fontRef idx="minor">
+            <a:schemeClr val="tx1"/>
+          </a:fontRef>
+        </p:style>
+      </p:cxnSp>
+    </p:spTree>
+    <p:extLst>
+      <p:ext uri="{BB962C8B-B14F-4D97-AF65-F5344CB8AC3E}">
+        <p14:creationId xmlns:p14="http://schemas.microsoft.com/office/powerpoint/2010/main" val="1042987813"/>
+      </p:ext>
+    </p:extLst>
+  </p:cSld>
+  <p:clrMapOvr>
+    <a:masterClrMapping/>
+  </p:clrMapOvr>
+</p:sld>
+</file>
+
+<file path=ppt/slides/slide2.xml><?xml version="1.0" encoding="utf-8"?>
+<p:sld xmlns:a="http://schemas.openxmlformats.org/drawingml/2006/main" xmlns:r="http://schemas.openxmlformats.org/officeDocument/2006/relationships" xmlns:p="http://schemas.openxmlformats.org/presentationml/2006/main">
+  <p:cSld>
     <p:spTree>
       <p:nvGrpSpPr>
         <p:cNvPr id="1" name=""/>

</xml_diff>

<commit_message>
Update for next speaker
</commit_message>
<xml_diff>
--- a/MSOSS_title.pptx
+++ b/MSOSS_title.pptx
@@ -299,7 +299,7 @@
           <a:p>
             <a:fld id="{9FE723E2-BC0F-4A2F-84D1-E095482B85E6}" type="datetimeFigureOut">
               <a:rPr lang="en-CA" smtClean="0"/>
-              <a:t>2021-08-31</a:t>
+              <a:t>2021-09-18</a:t>
             </a:fld>
             <a:endParaRPr lang="en-CA"/>
           </a:p>
@@ -574,7 +574,7 @@
           <a:p>
             <a:fld id="{9FE723E2-BC0F-4A2F-84D1-E095482B85E6}" type="datetimeFigureOut">
               <a:rPr lang="en-CA" smtClean="0"/>
-              <a:t>2021-08-31</a:t>
+              <a:t>2021-09-18</a:t>
             </a:fld>
             <a:endParaRPr lang="en-CA"/>
           </a:p>
@@ -768,7 +768,7 @@
           <a:p>
             <a:fld id="{9FE723E2-BC0F-4A2F-84D1-E095482B85E6}" type="datetimeFigureOut">
               <a:rPr lang="en-CA" smtClean="0"/>
-              <a:t>2021-08-31</a:t>
+              <a:t>2021-09-18</a:t>
             </a:fld>
             <a:endParaRPr lang="en-CA"/>
           </a:p>
@@ -1041,7 +1041,7 @@
           <a:p>
             <a:fld id="{9FE723E2-BC0F-4A2F-84D1-E095482B85E6}" type="datetimeFigureOut">
               <a:rPr lang="en-CA" smtClean="0"/>
-              <a:t>2021-08-31</a:t>
+              <a:t>2021-09-18</a:t>
             </a:fld>
             <a:endParaRPr lang="en-CA"/>
           </a:p>
@@ -1382,7 +1382,7 @@
           <a:p>
             <a:fld id="{9FE723E2-BC0F-4A2F-84D1-E095482B85E6}" type="datetimeFigureOut">
               <a:rPr lang="en-CA" smtClean="0"/>
-              <a:t>2021-08-31</a:t>
+              <a:t>2021-09-18</a:t>
             </a:fld>
             <a:endParaRPr lang="en-CA"/>
           </a:p>
@@ -2005,7 +2005,7 @@
           <a:p>
             <a:fld id="{9FE723E2-BC0F-4A2F-84D1-E095482B85E6}" type="datetimeFigureOut">
               <a:rPr lang="en-CA" smtClean="0"/>
-              <a:t>2021-08-31</a:t>
+              <a:t>2021-09-18</a:t>
             </a:fld>
             <a:endParaRPr lang="en-CA"/>
           </a:p>
@@ -2865,7 +2865,7 @@
           <a:p>
             <a:fld id="{9FE723E2-BC0F-4A2F-84D1-E095482B85E6}" type="datetimeFigureOut">
               <a:rPr lang="en-CA" smtClean="0"/>
-              <a:t>2021-08-31</a:t>
+              <a:t>2021-09-18</a:t>
             </a:fld>
             <a:endParaRPr lang="en-CA"/>
           </a:p>
@@ -3035,7 +3035,7 @@
           <a:p>
             <a:fld id="{9FE723E2-BC0F-4A2F-84D1-E095482B85E6}" type="datetimeFigureOut">
               <a:rPr lang="en-CA" smtClean="0"/>
-              <a:t>2021-08-31</a:t>
+              <a:t>2021-09-18</a:t>
             </a:fld>
             <a:endParaRPr lang="en-CA"/>
           </a:p>
@@ -3215,7 +3215,7 @@
           <a:p>
             <a:fld id="{9FE723E2-BC0F-4A2F-84D1-E095482B85E6}" type="datetimeFigureOut">
               <a:rPr lang="en-CA" smtClean="0"/>
-              <a:t>2021-08-31</a:t>
+              <a:t>2021-09-18</a:t>
             </a:fld>
             <a:endParaRPr lang="en-CA"/>
           </a:p>
@@ -3385,7 +3385,7 @@
           <a:p>
             <a:fld id="{9FE723E2-BC0F-4A2F-84D1-E095482B85E6}" type="datetimeFigureOut">
               <a:rPr lang="en-CA" smtClean="0"/>
-              <a:t>2021-08-31</a:t>
+              <a:t>2021-09-18</a:t>
             </a:fld>
             <a:endParaRPr lang="en-CA"/>
           </a:p>
@@ -3632,7 +3632,7 @@
           <a:p>
             <a:fld id="{9FE723E2-BC0F-4A2F-84D1-E095482B85E6}" type="datetimeFigureOut">
               <a:rPr lang="en-CA" smtClean="0"/>
-              <a:t>2021-08-31</a:t>
+              <a:t>2021-09-18</a:t>
             </a:fld>
             <a:endParaRPr lang="en-CA"/>
           </a:p>
@@ -3924,7 +3924,7 @@
           <a:p>
             <a:fld id="{9FE723E2-BC0F-4A2F-84D1-E095482B85E6}" type="datetimeFigureOut">
               <a:rPr lang="en-CA" smtClean="0"/>
-              <a:t>2021-08-31</a:t>
+              <a:t>2021-09-18</a:t>
             </a:fld>
             <a:endParaRPr lang="en-CA"/>
           </a:p>
@@ -4368,7 +4368,7 @@
           <a:p>
             <a:fld id="{9FE723E2-BC0F-4A2F-84D1-E095482B85E6}" type="datetimeFigureOut">
               <a:rPr lang="en-CA" smtClean="0"/>
-              <a:t>2021-08-31</a:t>
+              <a:t>2021-09-18</a:t>
             </a:fld>
             <a:endParaRPr lang="en-CA"/>
           </a:p>
@@ -4486,7 +4486,7 @@
           <a:p>
             <a:fld id="{9FE723E2-BC0F-4A2F-84D1-E095482B85E6}" type="datetimeFigureOut">
               <a:rPr lang="en-CA" smtClean="0"/>
-              <a:t>2021-08-31</a:t>
+              <a:t>2021-09-18</a:t>
             </a:fld>
             <a:endParaRPr lang="en-CA"/>
           </a:p>
@@ -4581,7 +4581,7 @@
           <a:p>
             <a:fld id="{9FE723E2-BC0F-4A2F-84D1-E095482B85E6}" type="datetimeFigureOut">
               <a:rPr lang="en-CA" smtClean="0"/>
-              <a:t>2021-08-31</a:t>
+              <a:t>2021-09-18</a:t>
             </a:fld>
             <a:endParaRPr lang="en-CA"/>
           </a:p>
@@ -4860,7 +4860,7 @@
           <a:p>
             <a:fld id="{9FE723E2-BC0F-4A2F-84D1-E095482B85E6}" type="datetimeFigureOut">
               <a:rPr lang="en-CA" smtClean="0"/>
-              <a:t>2021-08-31</a:t>
+              <a:t>2021-09-18</a:t>
             </a:fld>
             <a:endParaRPr lang="en-CA"/>
           </a:p>
@@ -5135,7 +5135,7 @@
           <a:p>
             <a:fld id="{9FE723E2-BC0F-4A2F-84D1-E095482B85E6}" type="datetimeFigureOut">
               <a:rPr lang="en-CA" smtClean="0"/>
-              <a:t>2021-08-31</a:t>
+              <a:t>2021-09-18</a:t>
             </a:fld>
             <a:endParaRPr lang="en-CA"/>
           </a:p>
@@ -5564,7 +5564,7 @@
           <a:p>
             <a:fld id="{9FE723E2-BC0F-4A2F-84D1-E095482B85E6}" type="datetimeFigureOut">
               <a:rPr lang="en-CA" smtClean="0"/>
-              <a:t>2021-08-31</a:t>
+              <a:t>2021-09-18</a:t>
             </a:fld>
             <a:endParaRPr lang="en-CA"/>
           </a:p>
@@ -6463,26 +6463,37 @@
         </p:nvSpPr>
         <p:spPr>
           <a:xfrm>
-            <a:off x="7241067" y="2539490"/>
-            <a:ext cx="4950933" cy="2765725"/>
+            <a:off x="7241067" y="2671780"/>
+            <a:ext cx="4950933" cy="2391769"/>
           </a:xfrm>
         </p:spPr>
         <p:txBody>
-          <a:bodyPr/>
+          <a:bodyPr>
+            <a:noAutofit/>
+          </a:bodyPr>
           <a:lstStyle/>
           <a:p>
             <a:pPr algn="ctr"/>
             <a:r>
-              <a:rPr lang="en-CA" sz="5400" b="1" dirty="0">
+              <a:rPr lang="en-CA" sz="4800" b="1" dirty="0">
                 <a:solidFill>
                   <a:schemeClr val="bg1"/>
                 </a:solidFill>
                 <a:latin typeface="Myriad Pro Cond" panose="020B0506030403020204" pitchFamily="34" charset="0"/>
               </a:rPr>
-              <a:t>Lauren Blum</a:t>
+              <a:t>Jasper </a:t>
+            </a:r>
+            <a:r>
+              <a:rPr lang="en-CA" sz="4800" b="1" dirty="0" err="1">
+                <a:solidFill>
+                  <a:schemeClr val="bg1"/>
+                </a:solidFill>
+                <a:latin typeface="Myriad Pro Cond" panose="020B0506030403020204" pitchFamily="34" charset="0"/>
+              </a:rPr>
+              <a:t>Halekas</a:t>
             </a:r>
             <a:br>
-              <a:rPr lang="en-CA" sz="5400" b="1" dirty="0">
+              <a:rPr lang="en-CA" sz="4800" b="1" dirty="0">
                 <a:solidFill>
                   <a:schemeClr val="bg1"/>
                 </a:solidFill>
@@ -6490,14 +6501,20 @@
               </a:rPr>
             </a:br>
             <a:r>
-              <a:rPr lang="en-CA" sz="5400" dirty="0">
+              <a:rPr lang="en-US" sz="4800" dirty="0">
                 <a:solidFill>
                   <a:schemeClr val="bg1"/>
                 </a:solidFill>
                 <a:latin typeface="Myriad Pro Cond" panose="020B0506030403020204" pitchFamily="34" charset="0"/>
               </a:rPr>
-              <a:t>Energetic Particle Precipitation</a:t>
-            </a:r>
+              <a:t>Plasma Physics at the Moon</a:t>
+            </a:r>
+            <a:endParaRPr lang="en-CA" sz="4800" dirty="0">
+              <a:solidFill>
+                <a:schemeClr val="bg1"/>
+              </a:solidFill>
+              <a:latin typeface="Myriad Pro Cond" panose="020B0506030403020204" pitchFamily="34" charset="0"/>
+            </a:endParaRPr>
           </a:p>
         </p:txBody>
       </p:sp>
@@ -6519,7 +6536,7 @@
         </p:nvSpPr>
         <p:spPr>
           <a:xfrm>
-            <a:off x="8304159" y="5789080"/>
+            <a:off x="8304159" y="5560162"/>
             <a:ext cx="2824748" cy="525223"/>
           </a:xfrm>
         </p:spPr>
@@ -6536,7 +6553,7 @@
                   <a:schemeClr val="bg1"/>
                 </a:solidFill>
               </a:rPr>
-              <a:t>September 13, 2021</a:t>
+              <a:t>September 27, 2021</a:t>
             </a:r>
           </a:p>
         </p:txBody>
@@ -6557,7 +6574,7 @@
         </p:nvCxnSpPr>
         <p:spPr>
           <a:xfrm>
-            <a:off x="8128690" y="5490570"/>
+            <a:off x="8128690" y="5312770"/>
             <a:ext cx="3175686" cy="0"/>
           </a:xfrm>
           <a:prstGeom prst="line">

</xml_diff>

<commit_message>
update fopr next seminar
</commit_message>
<xml_diff>
--- a/MSOSS_title.pptx
+++ b/MSOSS_title.pptx
@@ -299,7 +299,7 @@
           <a:p>
             <a:fld id="{9FE723E2-BC0F-4A2F-84D1-E095482B85E6}" type="datetimeFigureOut">
               <a:rPr lang="en-CA" smtClean="0"/>
-              <a:t>2022-03-13</a:t>
+              <a:t>2022-04-24</a:t>
             </a:fld>
             <a:endParaRPr lang="en-CA"/>
           </a:p>
@@ -574,7 +574,7 @@
           <a:p>
             <a:fld id="{9FE723E2-BC0F-4A2F-84D1-E095482B85E6}" type="datetimeFigureOut">
               <a:rPr lang="en-CA" smtClean="0"/>
-              <a:t>2022-03-13</a:t>
+              <a:t>2022-04-24</a:t>
             </a:fld>
             <a:endParaRPr lang="en-CA"/>
           </a:p>
@@ -768,7 +768,7 @@
           <a:p>
             <a:fld id="{9FE723E2-BC0F-4A2F-84D1-E095482B85E6}" type="datetimeFigureOut">
               <a:rPr lang="en-CA" smtClean="0"/>
-              <a:t>2022-03-13</a:t>
+              <a:t>2022-04-24</a:t>
             </a:fld>
             <a:endParaRPr lang="en-CA"/>
           </a:p>
@@ -1041,7 +1041,7 @@
           <a:p>
             <a:fld id="{9FE723E2-BC0F-4A2F-84D1-E095482B85E6}" type="datetimeFigureOut">
               <a:rPr lang="en-CA" smtClean="0"/>
-              <a:t>2022-03-13</a:t>
+              <a:t>2022-04-24</a:t>
             </a:fld>
             <a:endParaRPr lang="en-CA"/>
           </a:p>
@@ -1382,7 +1382,7 @@
           <a:p>
             <a:fld id="{9FE723E2-BC0F-4A2F-84D1-E095482B85E6}" type="datetimeFigureOut">
               <a:rPr lang="en-CA" smtClean="0"/>
-              <a:t>2022-03-13</a:t>
+              <a:t>2022-04-24</a:t>
             </a:fld>
             <a:endParaRPr lang="en-CA"/>
           </a:p>
@@ -2005,7 +2005,7 @@
           <a:p>
             <a:fld id="{9FE723E2-BC0F-4A2F-84D1-E095482B85E6}" type="datetimeFigureOut">
               <a:rPr lang="en-CA" smtClean="0"/>
-              <a:t>2022-03-13</a:t>
+              <a:t>2022-04-24</a:t>
             </a:fld>
             <a:endParaRPr lang="en-CA"/>
           </a:p>
@@ -2865,7 +2865,7 @@
           <a:p>
             <a:fld id="{9FE723E2-BC0F-4A2F-84D1-E095482B85E6}" type="datetimeFigureOut">
               <a:rPr lang="en-CA" smtClean="0"/>
-              <a:t>2022-03-13</a:t>
+              <a:t>2022-04-24</a:t>
             </a:fld>
             <a:endParaRPr lang="en-CA"/>
           </a:p>
@@ -3035,7 +3035,7 @@
           <a:p>
             <a:fld id="{9FE723E2-BC0F-4A2F-84D1-E095482B85E6}" type="datetimeFigureOut">
               <a:rPr lang="en-CA" smtClean="0"/>
-              <a:t>2022-03-13</a:t>
+              <a:t>2022-04-24</a:t>
             </a:fld>
             <a:endParaRPr lang="en-CA"/>
           </a:p>
@@ -3215,7 +3215,7 @@
           <a:p>
             <a:fld id="{9FE723E2-BC0F-4A2F-84D1-E095482B85E6}" type="datetimeFigureOut">
               <a:rPr lang="en-CA" smtClean="0"/>
-              <a:t>2022-03-13</a:t>
+              <a:t>2022-04-24</a:t>
             </a:fld>
             <a:endParaRPr lang="en-CA"/>
           </a:p>
@@ -3385,7 +3385,7 @@
           <a:p>
             <a:fld id="{9FE723E2-BC0F-4A2F-84D1-E095482B85E6}" type="datetimeFigureOut">
               <a:rPr lang="en-CA" smtClean="0"/>
-              <a:t>2022-03-13</a:t>
+              <a:t>2022-04-24</a:t>
             </a:fld>
             <a:endParaRPr lang="en-CA"/>
           </a:p>
@@ -3632,7 +3632,7 @@
           <a:p>
             <a:fld id="{9FE723E2-BC0F-4A2F-84D1-E095482B85E6}" type="datetimeFigureOut">
               <a:rPr lang="en-CA" smtClean="0"/>
-              <a:t>2022-03-13</a:t>
+              <a:t>2022-04-24</a:t>
             </a:fld>
             <a:endParaRPr lang="en-CA"/>
           </a:p>
@@ -3924,7 +3924,7 @@
           <a:p>
             <a:fld id="{9FE723E2-BC0F-4A2F-84D1-E095482B85E6}" type="datetimeFigureOut">
               <a:rPr lang="en-CA" smtClean="0"/>
-              <a:t>2022-03-13</a:t>
+              <a:t>2022-04-24</a:t>
             </a:fld>
             <a:endParaRPr lang="en-CA"/>
           </a:p>
@@ -4368,7 +4368,7 @@
           <a:p>
             <a:fld id="{9FE723E2-BC0F-4A2F-84D1-E095482B85E6}" type="datetimeFigureOut">
               <a:rPr lang="en-CA" smtClean="0"/>
-              <a:t>2022-03-13</a:t>
+              <a:t>2022-04-24</a:t>
             </a:fld>
             <a:endParaRPr lang="en-CA"/>
           </a:p>
@@ -4486,7 +4486,7 @@
           <a:p>
             <a:fld id="{9FE723E2-BC0F-4A2F-84D1-E095482B85E6}" type="datetimeFigureOut">
               <a:rPr lang="en-CA" smtClean="0"/>
-              <a:t>2022-03-13</a:t>
+              <a:t>2022-04-24</a:t>
             </a:fld>
             <a:endParaRPr lang="en-CA"/>
           </a:p>
@@ -4581,7 +4581,7 @@
           <a:p>
             <a:fld id="{9FE723E2-BC0F-4A2F-84D1-E095482B85E6}" type="datetimeFigureOut">
               <a:rPr lang="en-CA" smtClean="0"/>
-              <a:t>2022-03-13</a:t>
+              <a:t>2022-04-24</a:t>
             </a:fld>
             <a:endParaRPr lang="en-CA"/>
           </a:p>
@@ -4860,7 +4860,7 @@
           <a:p>
             <a:fld id="{9FE723E2-BC0F-4A2F-84D1-E095482B85E6}" type="datetimeFigureOut">
               <a:rPr lang="en-CA" smtClean="0"/>
-              <a:t>2022-03-13</a:t>
+              <a:t>2022-04-24</a:t>
             </a:fld>
             <a:endParaRPr lang="en-CA"/>
           </a:p>
@@ -5135,7 +5135,7 @@
           <a:p>
             <a:fld id="{9FE723E2-BC0F-4A2F-84D1-E095482B85E6}" type="datetimeFigureOut">
               <a:rPr lang="en-CA" smtClean="0"/>
-              <a:t>2022-03-13</a:t>
+              <a:t>2022-04-24</a:t>
             </a:fld>
             <a:endParaRPr lang="en-CA"/>
           </a:p>
@@ -5564,7 +5564,7 @@
           <a:p>
             <a:fld id="{9FE723E2-BC0F-4A2F-84D1-E095482B85E6}" type="datetimeFigureOut">
               <a:rPr lang="en-CA" smtClean="0"/>
-              <a:t>2022-03-13</a:t>
+              <a:t>2022-04-24</a:t>
             </a:fld>
             <a:endParaRPr lang="en-CA"/>
           </a:p>
@@ -6481,7 +6481,7 @@
                 </a:solidFill>
                 <a:latin typeface="Myriad Pro Cond" panose="020B0506030403020204" pitchFamily="34" charset="0"/>
               </a:rPr>
-              <a:t>Colin Forsyth</a:t>
+              <a:t>Andrei Runov</a:t>
             </a:r>
           </a:p>
         </p:txBody>
@@ -6510,20 +6510,20 @@
         </p:spPr>
         <p:txBody>
           <a:bodyPr>
-            <a:normAutofit lnSpcReduction="10000"/>
+            <a:normAutofit/>
           </a:bodyPr>
           <a:lstStyle/>
           <a:p>
             <a:pPr algn="ctr"/>
             <a:r>
-              <a:rPr lang="en-US" sz="3200" b="1" dirty="0">
+              <a:rPr lang="en-US" sz="4000" b="1" dirty="0">
                 <a:solidFill>
                   <a:schemeClr val="bg1"/>
                 </a:solidFill>
               </a:rPr>
-              <a:t>Physical Processes of Meso-scale, dynamic auroral forms</a:t>
-            </a:r>
-            <a:endParaRPr lang="en-CA" sz="3200" b="1" dirty="0">
+              <a:t>Magnetotail Transients Revisited</a:t>
+            </a:r>
+            <a:endParaRPr lang="en-CA" sz="4000" b="1" dirty="0">
               <a:solidFill>
                 <a:schemeClr val="bg1"/>
               </a:solidFill>

</xml_diff>